<commit_message>
Plan Added to Presentation
</commit_message>
<xml_diff>
--- a/Iteration 3 PowerPoint/Team 3 Iteration 3.pptx
+++ b/Iteration 3 PowerPoint/Team 3 Iteration 3.pptx
@@ -4157,21 +4157,21 @@
       </p:sp>
       <p:graphicFrame>
         <p:nvGraphicFramePr>
-          <p:cNvPr id="3" name="Table 2"/>
+          <p:cNvPr id="5" name="Table 4"/>
           <p:cNvGraphicFramePr>
             <a:graphicFrameLocks noGrp="1"/>
           </p:cNvGraphicFramePr>
           <p:nvPr>
             <p:extLst>
               <p:ext uri="{D42A27DB-BD31-4B8C-83A1-F6EECF244321}">
-                <p14:modId xmlns:p14="http://schemas.microsoft.com/office/powerpoint/2010/main" val="4079684413"/>
+                <p14:modId xmlns:p14="http://schemas.microsoft.com/office/powerpoint/2010/main" val="3989765156"/>
               </p:ext>
             </p:extLst>
           </p:nvPr>
         </p:nvGraphicFramePr>
         <p:xfrm>
-          <a:off x="228600" y="1524000"/>
-          <a:ext cx="8077198" cy="5105399"/>
+          <a:off x="152400" y="1447800"/>
+          <a:ext cx="8077198" cy="5181601"/>
         </p:xfrm>
         <a:graphic>
           <a:graphicData uri="http://schemas.openxmlformats.org/drawingml/2006/table">
@@ -4193,20 +4193,20 @@
                 <a:gridCol w="563525"/>
                 <a:gridCol w="563525"/>
               </a:tblGrid>
-              <a:tr h="115288">
-                <a:tc>
-                  <a:txBody>
-                    <a:bodyPr/>
-                    <a:lstStyle/>
-                    <a:p>
-                      <a:pPr algn="l" fontAlgn="b"/>
-                      <a:r>
-                        <a:rPr lang="en-US" sz="600" u="none" strike="noStrike">
+              <a:tr h="117009">
+                <a:tc>
+                  <a:txBody>
+                    <a:bodyPr/>
+                    <a:lstStyle/>
+                    <a:p>
+                      <a:pPr algn="l" fontAlgn="b"/>
+                      <a:r>
+                        <a:rPr lang="en-US" sz="600" u="none" strike="noStrike" dirty="0">
                           <a:effectLst/>
                         </a:rPr>
                         <a:t>Due</a:t>
                       </a:r>
-                      <a:endParaRPr lang="en-US" sz="600" b="0" i="0" u="none" strike="noStrike">
+                      <a:endParaRPr lang="en-US" sz="600" b="0" i="0" u="none" strike="noStrike" dirty="0">
                         <a:solidFill>
                           <a:srgbClr val="000000"/>
                         </a:solidFill>
@@ -4446,7 +4446,7 @@
                   <a:tcPr marL="5627" marR="5627" marT="5627" marB="0" anchor="b"/>
                 </a:tc>
               </a:tr>
-              <a:tr h="115288">
+              <a:tr h="117009">
                 <a:tc>
                   <a:txBody>
                     <a:bodyPr/>
@@ -4706,7 +4706,7 @@
                   <a:tcPr marL="5627" marR="5627" marT="5627" marB="0" anchor="b"/>
                 </a:tc>
               </a:tr>
-              <a:tr h="115288">
+              <a:tr h="117009">
                 <a:tc>
                   <a:txBody>
                     <a:bodyPr/>
@@ -4966,7 +4966,7 @@
                   <a:tcPr marL="5627" marR="5627" marT="5627" marB="0" anchor="b"/>
                 </a:tc>
               </a:tr>
-              <a:tr h="115288">
+              <a:tr h="117009">
                 <a:tc>
                   <a:txBody>
                     <a:bodyPr/>
@@ -5226,7 +5226,7 @@
                   <a:tcPr marL="5627" marR="5627" marT="5627" marB="0" anchor="b"/>
                 </a:tc>
               </a:tr>
-              <a:tr h="115288">
+              <a:tr h="117009">
                 <a:tc>
                   <a:txBody>
                     <a:bodyPr/>
@@ -5486,7 +5486,7 @@
                   <a:tcPr marL="5627" marR="5627" marT="5627" marB="0" anchor="b"/>
                 </a:tc>
               </a:tr>
-              <a:tr h="115288">
+              <a:tr h="117009">
                 <a:tc>
                   <a:txBody>
                     <a:bodyPr/>
@@ -5746,7 +5746,7 @@
                   <a:tcPr marL="5627" marR="5627" marT="5627" marB="0" anchor="b"/>
                 </a:tc>
               </a:tr>
-              <a:tr h="115288">
+              <a:tr h="117009">
                 <a:tc>
                   <a:txBody>
                     <a:bodyPr/>
@@ -6006,7 +6006,7 @@
                   <a:tcPr marL="5627" marR="5627" marT="5627" marB="0" anchor="b"/>
                 </a:tc>
               </a:tr>
-              <a:tr h="115288">
+              <a:tr h="117009">
                 <a:tc>
                   <a:txBody>
                     <a:bodyPr/>
@@ -6266,7 +6266,7 @@
                   <a:tcPr marL="5627" marR="5627" marT="5627" marB="0" anchor="b"/>
                 </a:tc>
               </a:tr>
-              <a:tr h="115288">
+              <a:tr h="117009">
                 <a:tc>
                   <a:txBody>
                     <a:bodyPr/>
@@ -6526,7 +6526,7 @@
                   <a:tcPr marL="5627" marR="5627" marT="5627" marB="0" anchor="b"/>
                 </a:tc>
               </a:tr>
-              <a:tr h="115288">
+              <a:tr h="117009">
                 <a:tc>
                   <a:txBody>
                     <a:bodyPr/>
@@ -6786,7 +6786,7 @@
                   <a:tcPr marL="5627" marR="5627" marT="5627" marB="0" anchor="b"/>
                 </a:tc>
               </a:tr>
-              <a:tr h="115288">
+              <a:tr h="117009">
                 <a:tc>
                   <a:txBody>
                     <a:bodyPr/>
@@ -7046,7 +7046,7 @@
                   <a:tcPr marL="5627" marR="5627" marT="5627" marB="0" anchor="b"/>
                 </a:tc>
               </a:tr>
-              <a:tr h="115288">
+              <a:tr h="117009">
                 <a:tc>
                   <a:txBody>
                     <a:bodyPr/>
@@ -7306,7 +7306,7 @@
                   <a:tcPr marL="5627" marR="5627" marT="5627" marB="0" anchor="b"/>
                 </a:tc>
               </a:tr>
-              <a:tr h="115288">
+              <a:tr h="117009">
                 <a:tc>
                   <a:txBody>
                     <a:bodyPr/>
@@ -7566,7 +7566,7 @@
                   <a:tcPr marL="5627" marR="5627" marT="5627" marB="0" anchor="b"/>
                 </a:tc>
               </a:tr>
-              <a:tr h="115288">
+              <a:tr h="117009">
                 <a:tc>
                   <a:txBody>
                     <a:bodyPr/>
@@ -7826,7 +7826,7 @@
                   <a:tcPr marL="5627" marR="5627" marT="5627" marB="0" anchor="b"/>
                 </a:tc>
               </a:tr>
-              <a:tr h="115288">
+              <a:tr h="117009">
                 <a:tc>
                   <a:txBody>
                     <a:bodyPr/>
@@ -8086,7 +8086,7 @@
                   <a:tcPr marL="5627" marR="5627" marT="5627" marB="0" anchor="b"/>
                 </a:tc>
               </a:tr>
-              <a:tr h="115288">
+              <a:tr h="117009">
                 <a:tc>
                   <a:txBody>
                     <a:bodyPr/>
@@ -8346,7 +8346,7 @@
                   <a:tcPr marL="5627" marR="5627" marT="5627" marB="0" anchor="b"/>
                 </a:tc>
               </a:tr>
-              <a:tr h="115288">
+              <a:tr h="117009">
                 <a:tc>
                   <a:txBody>
                     <a:bodyPr/>
@@ -8606,7 +8606,7 @@
                   <a:tcPr marL="5627" marR="5627" marT="5627" marB="0" anchor="b"/>
                 </a:tc>
               </a:tr>
-              <a:tr h="119677">
+              <a:tr h="121463">
                 <a:tc>
                   <a:txBody>
                     <a:bodyPr/>
@@ -8866,7 +8866,7 @@
                   <a:tcPr marL="5627" marR="5627" marT="5627" marB="0" anchor="b"/>
                 </a:tc>
               </a:tr>
-              <a:tr h="119677">
+              <a:tr h="121463">
                 <a:tc>
                   <a:txBody>
                     <a:bodyPr/>
@@ -9118,7 +9118,7 @@
                   <a:tcPr/>
                 </a:tc>
               </a:tr>
-              <a:tr h="216614">
+              <a:tr h="219847">
                 <a:tc>
                   <a:txBody>
                     <a:bodyPr/>
@@ -9396,7 +9396,7 @@
                   <a:tcPr marL="5627" marR="5627" marT="5627" marB="0" anchor="b"/>
                 </a:tc>
               </a:tr>
-              <a:tr h="119677">
+              <a:tr h="121463">
                 <a:tc>
                   <a:txBody>
                     <a:bodyPr/>
@@ -9674,7 +9674,7 @@
                   <a:tcPr marL="5627" marR="5627" marT="5627" marB="0" anchor="b"/>
                 </a:tc>
               </a:tr>
-              <a:tr h="119677">
+              <a:tr h="121463">
                 <a:tc>
                   <a:txBody>
                     <a:bodyPr/>
@@ -9934,7 +9934,7 @@
                   <a:tcPr marL="5627" marR="5627" marT="5627" marB="0" anchor="b"/>
                 </a:tc>
               </a:tr>
-              <a:tr h="119677">
+              <a:tr h="121463">
                 <a:tc>
                   <a:txBody>
                     <a:bodyPr/>
@@ -10194,7 +10194,7 @@
                   <a:tcPr marL="5627" marR="5627" marT="5627" marB="0" anchor="b"/>
                 </a:tc>
               </a:tr>
-              <a:tr h="119677">
+              <a:tr h="121463">
                 <a:tc>
                   <a:txBody>
                     <a:bodyPr/>
@@ -10454,7 +10454,7 @@
                   <a:tcPr marL="5627" marR="5627" marT="5627" marB="0" anchor="b"/>
                 </a:tc>
               </a:tr>
-              <a:tr h="115288">
+              <a:tr h="117009">
                 <a:tc>
                   <a:txBody>
                     <a:bodyPr/>
@@ -10714,7 +10714,7 @@
                   <a:tcPr marL="5627" marR="5627" marT="5627" marB="0" anchor="b"/>
                 </a:tc>
               </a:tr>
-              <a:tr h="115288">
+              <a:tr h="117009">
                 <a:tc>
                   <a:txBody>
                     <a:bodyPr/>
@@ -10974,7 +10974,7 @@
                   <a:tcPr marL="5627" marR="5627" marT="5627" marB="0" anchor="b"/>
                 </a:tc>
               </a:tr>
-              <a:tr h="115288">
+              <a:tr h="117009">
                 <a:tc>
                   <a:txBody>
                     <a:bodyPr/>
@@ -11234,7 +11234,7 @@
                   <a:tcPr marL="5627" marR="5627" marT="5627" marB="0" anchor="b"/>
                 </a:tc>
               </a:tr>
-              <a:tr h="115288">
+              <a:tr h="117009">
                 <a:tc>
                   <a:txBody>
                     <a:bodyPr/>
@@ -11494,7 +11494,7 @@
                   <a:tcPr marL="5627" marR="5627" marT="5627" marB="0" anchor="b"/>
                 </a:tc>
               </a:tr>
-              <a:tr h="119677">
+              <a:tr h="121463">
                 <a:tc>
                   <a:txBody>
                     <a:bodyPr/>
@@ -11754,7 +11754,7 @@
                   <a:tcPr marL="5627" marR="5627" marT="5627" marB="0" anchor="b"/>
                 </a:tc>
               </a:tr>
-              <a:tr h="119677">
+              <a:tr h="121463">
                 <a:tc>
                   <a:txBody>
                     <a:bodyPr/>
@@ -12014,7 +12014,7 @@
                   <a:tcPr marL="5627" marR="5627" marT="5627" marB="0" anchor="b"/>
                 </a:tc>
               </a:tr>
-              <a:tr h="119677">
+              <a:tr h="121463">
                 <a:tc>
                   <a:txBody>
                     <a:bodyPr/>
@@ -12266,7 +12266,7 @@
                   <a:tcPr/>
                 </a:tc>
               </a:tr>
-              <a:tr h="216614">
+              <a:tr h="219847">
                 <a:tc>
                   <a:txBody>
                     <a:bodyPr/>
@@ -12295,6 +12295,261 @@
                     <a:bodyPr/>
                     <a:lstStyle/>
                     <a:p>
+                      <a:pPr algn="r" fontAlgn="b"/>
+                      <a:r>
+                        <a:rPr lang="en-US" sz="600" u="none" strike="noStrike">
+                          <a:effectLst/>
+                        </a:rPr>
+                        <a:t>3</a:t>
+                      </a:r>
+                      <a:endParaRPr lang="en-US" sz="600" b="0" i="0" u="none" strike="noStrike">
+                        <a:solidFill>
+                          <a:srgbClr val="9C6500"/>
+                        </a:solidFill>
+                        <a:effectLst/>
+                        <a:latin typeface="Calibri"/>
+                      </a:endParaRPr>
+                    </a:p>
+                  </a:txBody>
+                  <a:tcPr marL="5627" marR="5627" marT="5627" marB="0" anchor="b"/>
+                </a:tc>
+                <a:tc>
+                  <a:txBody>
+                    <a:bodyPr/>
+                    <a:lstStyle/>
+                    <a:p>
+                      <a:pPr algn="l" fontAlgn="b"/>
+                      <a:r>
+                        <a:rPr lang="en-US" sz="600" u="none" strike="noStrike">
+                          <a:effectLst/>
+                        </a:rPr>
+                        <a:t>Work Recording</a:t>
+                      </a:r>
+                      <a:endParaRPr lang="en-US" sz="600" b="0" i="0" u="none" strike="noStrike">
+                        <a:solidFill>
+                          <a:srgbClr val="9C6500"/>
+                        </a:solidFill>
+                        <a:effectLst/>
+                        <a:latin typeface="Calibri"/>
+                      </a:endParaRPr>
+                    </a:p>
+                  </a:txBody>
+                  <a:tcPr marL="5627" marR="5627" marT="5627" marB="0" anchor="b"/>
+                </a:tc>
+                <a:tc>
+                  <a:txBody>
+                    <a:bodyPr/>
+                    <a:lstStyle/>
+                    <a:p>
+                      <a:pPr algn="l" fontAlgn="b"/>
+                      <a:r>
+                        <a:rPr lang="en-US" sz="600" u="none" strike="noStrike">
+                          <a:effectLst/>
+                        </a:rPr>
+                        <a:t>Implementation</a:t>
+                      </a:r>
+                      <a:endParaRPr lang="en-US" sz="600" b="0" i="0" u="none" strike="noStrike">
+                        <a:solidFill>
+                          <a:srgbClr val="9C6500"/>
+                        </a:solidFill>
+                        <a:effectLst/>
+                        <a:latin typeface="Calibri"/>
+                      </a:endParaRPr>
+                    </a:p>
+                  </a:txBody>
+                  <a:tcPr marL="5627" marR="5627" marT="5627" marB="0" anchor="b"/>
+                </a:tc>
+                <a:tc>
+                  <a:txBody>
+                    <a:bodyPr/>
+                    <a:lstStyle/>
+                    <a:p>
+                      <a:pPr algn="l" fontAlgn="b"/>
+                      <a:r>
+                        <a:rPr lang="en-US" sz="600" u="none" strike="noStrike">
+                          <a:effectLst/>
+                        </a:rPr>
+                        <a:t>Jose</a:t>
+                      </a:r>
+                      <a:endParaRPr lang="en-US" sz="600" b="0" i="0" u="none" strike="noStrike">
+                        <a:solidFill>
+                          <a:srgbClr val="9C6500"/>
+                        </a:solidFill>
+                        <a:effectLst/>
+                        <a:latin typeface="Calibri"/>
+                      </a:endParaRPr>
+                    </a:p>
+                  </a:txBody>
+                  <a:tcPr marL="5627" marR="5627" marT="5627" marB="0" anchor="b"/>
+                </a:tc>
+                <a:tc>
+                  <a:txBody>
+                    <a:bodyPr/>
+                    <a:lstStyle/>
+                    <a:p>
+                      <a:pPr algn="r" fontAlgn="b"/>
+                      <a:r>
+                        <a:rPr lang="en-US" sz="600" u="none" strike="noStrike">
+                          <a:effectLst/>
+                        </a:rPr>
+                        <a:t>3</a:t>
+                      </a:r>
+                      <a:endParaRPr lang="en-US" sz="600" b="0" i="0" u="none" strike="noStrike">
+                        <a:solidFill>
+                          <a:srgbClr val="9C6500"/>
+                        </a:solidFill>
+                        <a:effectLst/>
+                        <a:latin typeface="Calibri"/>
+                      </a:endParaRPr>
+                    </a:p>
+                  </a:txBody>
+                  <a:tcPr marL="5627" marR="5627" marT="5627" marB="0" anchor="b"/>
+                </a:tc>
+                <a:tc>
+                  <a:txBody>
+                    <a:bodyPr/>
+                    <a:lstStyle/>
+                    <a:p>
+                      <a:pPr algn="r" fontAlgn="b"/>
+                      <a:r>
+                        <a:rPr lang="en-US" sz="600" u="none" strike="noStrike">
+                          <a:effectLst/>
+                        </a:rPr>
+                        <a:t>3</a:t>
+                      </a:r>
+                      <a:endParaRPr lang="en-US" sz="600" b="0" i="0" u="none" strike="noStrike">
+                        <a:solidFill>
+                          <a:srgbClr val="9C6500"/>
+                        </a:solidFill>
+                        <a:effectLst/>
+                        <a:latin typeface="Calibri"/>
+                      </a:endParaRPr>
+                    </a:p>
+                  </a:txBody>
+                  <a:tcPr marL="5627" marR="5627" marT="5627" marB="0" anchor="b"/>
+                </a:tc>
+                <a:tc>
+                  <a:txBody>
+                    <a:bodyPr/>
+                    <a:lstStyle/>
+                    <a:p>
+                      <a:pPr algn="r" fontAlgn="b"/>
+                      <a:r>
+                        <a:rPr lang="en-US" sz="600" u="none" strike="noStrike">
+                          <a:effectLst/>
+                        </a:rPr>
+                        <a:t>0</a:t>
+                      </a:r>
+                      <a:endParaRPr lang="en-US" sz="600" b="0" i="0" u="none" strike="noStrike">
+                        <a:solidFill>
+                          <a:srgbClr val="9C6500"/>
+                        </a:solidFill>
+                        <a:effectLst/>
+                        <a:latin typeface="Calibri"/>
+                      </a:endParaRPr>
+                    </a:p>
+                  </a:txBody>
+                  <a:tcPr marL="5627" marR="5627" marT="5627" marB="0" anchor="b"/>
+                </a:tc>
+                <a:tc>
+                  <a:txBody>
+                    <a:bodyPr/>
+                    <a:lstStyle/>
+                    <a:p>
+                      <a:pPr algn="l" fontAlgn="b"/>
+                      <a:r>
+                        <a:rPr lang="en-US" sz="600" u="none" strike="noStrike">
+                          <a:effectLst/>
+                        </a:rPr>
+                        <a:t>Done</a:t>
+                      </a:r>
+                      <a:endParaRPr lang="en-US" sz="600" b="0" i="0" u="none" strike="noStrike">
+                        <a:solidFill>
+                          <a:srgbClr val="000000"/>
+                        </a:solidFill>
+                        <a:effectLst/>
+                        <a:latin typeface="Calibri"/>
+                      </a:endParaRPr>
+                    </a:p>
+                  </a:txBody>
+                  <a:tcPr marL="5627" marR="5627" marT="5627" marB="0" anchor="b"/>
+                </a:tc>
+                <a:tc>
+                  <a:txBody>
+                    <a:bodyPr/>
+                    <a:lstStyle/>
+                    <a:p>
+                      <a:pPr algn="l" fontAlgn="b"/>
+                      <a:r>
+                        <a:rPr lang="en-US" sz="600" u="none" strike="noStrike">
+                          <a:effectLst/>
+                        </a:rPr>
+                        <a:t>Planned</a:t>
+                      </a:r>
+                      <a:endParaRPr lang="en-US" sz="600" b="0" i="0" u="none" strike="noStrike">
+                        <a:solidFill>
+                          <a:srgbClr val="000000"/>
+                        </a:solidFill>
+                        <a:effectLst/>
+                        <a:latin typeface="Calibri"/>
+                      </a:endParaRPr>
+                    </a:p>
+                  </a:txBody>
+                  <a:tcPr marL="5627" marR="5627" marT="5627" marB="0" anchor="b"/>
+                </a:tc>
+                <a:tc>
+                  <a:txBody>
+                    <a:bodyPr/>
+                    <a:lstStyle/>
+                    <a:p>
+                      <a:pPr algn="l" fontAlgn="b"/>
+                      <a:r>
+                        <a:rPr lang="en-US" sz="600" u="none" strike="noStrike">
+                          <a:effectLst/>
+                        </a:rPr>
+                        <a:t>Actual</a:t>
+                      </a:r>
+                      <a:endParaRPr lang="en-US" sz="600" b="0" i="0" u="none" strike="noStrike">
+                        <a:solidFill>
+                          <a:srgbClr val="000000"/>
+                        </a:solidFill>
+                        <a:effectLst/>
+                        <a:latin typeface="Calibri"/>
+                      </a:endParaRPr>
+                    </a:p>
+                  </a:txBody>
+                  <a:tcPr marL="5627" marR="5627" marT="5627" marB="0" anchor="b"/>
+                </a:tc>
+                <a:tc>
+                  <a:txBody>
+                    <a:bodyPr/>
+                    <a:lstStyle/>
+                    <a:p>
+                      <a:pPr algn="l" fontAlgn="b"/>
+                      <a:r>
+                        <a:rPr lang="en-US" sz="600" u="none" strike="noStrike">
+                          <a:effectLst/>
+                        </a:rPr>
+                        <a:t>Remaining</a:t>
+                      </a:r>
+                      <a:endParaRPr lang="en-US" sz="600" b="0" i="0" u="none" strike="noStrike">
+                        <a:solidFill>
+                          <a:srgbClr val="000000"/>
+                        </a:solidFill>
+                        <a:effectLst/>
+                        <a:latin typeface="Calibri"/>
+                      </a:endParaRPr>
+                    </a:p>
+                  </a:txBody>
+                  <a:tcPr marL="5627" marR="5627" marT="5627" marB="0" anchor="b"/>
+                </a:tc>
+              </a:tr>
+              <a:tr h="121463">
+                <a:tc>
+                  <a:txBody>
+                    <a:bodyPr/>
+                    <a:lstStyle/>
+                    <a:p>
                       <a:pPr algn="l" fontAlgn="b"/>
                       <a:r>
                         <a:rPr lang="en-US" sz="600" u="none" strike="noStrike">
@@ -12318,12 +12573,12 @@
                     <a:bodyPr/>
                     <a:lstStyle/>
                     <a:p>
-                      <a:pPr algn="l" fontAlgn="b"/>
-                      <a:r>
-                        <a:rPr lang="en-US" sz="600" u="none" strike="noStrike">
-                          <a:effectLst/>
-                        </a:rPr>
-                        <a:t>Work Recording</a:t>
+                      <a:pPr algn="r" fontAlgn="b"/>
+                      <a:r>
+                        <a:rPr lang="en-US" sz="600" u="none" strike="noStrike">
+                          <a:effectLst/>
+                        </a:rPr>
+                        <a:t>3</a:t>
                       </a:r>
                       <a:endParaRPr lang="en-US" sz="600" b="0" i="0" u="none" strike="noStrike">
                         <a:solidFill>
@@ -12346,6 +12601,29 @@
                         <a:rPr lang="en-US" sz="600" u="none" strike="noStrike">
                           <a:effectLst/>
                         </a:rPr>
+                        <a:t>Work Management</a:t>
+                      </a:r>
+                      <a:endParaRPr lang="en-US" sz="600" b="0" i="0" u="none" strike="noStrike">
+                        <a:solidFill>
+                          <a:srgbClr val="9C6500"/>
+                        </a:solidFill>
+                        <a:effectLst/>
+                        <a:latin typeface="Calibri"/>
+                      </a:endParaRPr>
+                    </a:p>
+                  </a:txBody>
+                  <a:tcPr marL="5627" marR="5627" marT="5627" marB="0" anchor="b"/>
+                </a:tc>
+                <a:tc>
+                  <a:txBody>
+                    <a:bodyPr/>
+                    <a:lstStyle/>
+                    <a:p>
+                      <a:pPr algn="l" fontAlgn="b"/>
+                      <a:r>
+                        <a:rPr lang="en-US" sz="600" u="none" strike="noStrike">
+                          <a:effectLst/>
+                        </a:rPr>
                         <a:t>Implementation</a:t>
                       </a:r>
                       <a:endParaRPr lang="en-US" sz="600" b="0" i="0" u="none" strike="noStrike">
@@ -12392,11 +12670,220 @@
                         <a:rPr lang="en-US" sz="600" u="none" strike="noStrike">
                           <a:effectLst/>
                         </a:rPr>
+                        <a:t>2</a:t>
+                      </a:r>
+                      <a:endParaRPr lang="en-US" sz="600" b="0" i="0" u="none" strike="noStrike">
+                        <a:solidFill>
+                          <a:srgbClr val="9C6500"/>
+                        </a:solidFill>
+                        <a:effectLst/>
+                        <a:latin typeface="Calibri"/>
+                      </a:endParaRPr>
+                    </a:p>
+                  </a:txBody>
+                  <a:tcPr marL="5627" marR="5627" marT="5627" marB="0" anchor="b"/>
+                </a:tc>
+                <a:tc>
+                  <a:txBody>
+                    <a:bodyPr/>
+                    <a:lstStyle/>
+                    <a:p>
+                      <a:pPr algn="r" fontAlgn="b"/>
+                      <a:r>
+                        <a:rPr lang="en-US" sz="600" u="none" strike="noStrike">
+                          <a:effectLst/>
+                        </a:rPr>
+                        <a:t>2</a:t>
+                      </a:r>
+                      <a:endParaRPr lang="en-US" sz="600" b="0" i="0" u="none" strike="noStrike">
+                        <a:solidFill>
+                          <a:srgbClr val="9C6500"/>
+                        </a:solidFill>
+                        <a:effectLst/>
+                        <a:latin typeface="Calibri"/>
+                      </a:endParaRPr>
+                    </a:p>
+                  </a:txBody>
+                  <a:tcPr marL="5627" marR="5627" marT="5627" marB="0" anchor="b"/>
+                </a:tc>
+                <a:tc>
+                  <a:txBody>
+                    <a:bodyPr/>
+                    <a:lstStyle/>
+                    <a:p>
+                      <a:pPr algn="r" fontAlgn="b"/>
+                      <a:r>
+                        <a:rPr lang="en-US" sz="600" u="none" strike="noStrike">
+                          <a:effectLst/>
+                        </a:rPr>
+                        <a:t>0</a:t>
+                      </a:r>
+                      <a:endParaRPr lang="en-US" sz="600" b="0" i="0" u="none" strike="noStrike">
+                        <a:solidFill>
+                          <a:srgbClr val="9C6500"/>
+                        </a:solidFill>
+                        <a:effectLst/>
+                        <a:latin typeface="Calibri"/>
+                      </a:endParaRPr>
+                    </a:p>
+                  </a:txBody>
+                  <a:tcPr marL="5627" marR="5627" marT="5627" marB="0" anchor="b"/>
+                </a:tc>
+                <a:tc>
+                  <a:txBody>
+                    <a:bodyPr/>
+                    <a:lstStyle/>
+                    <a:p>
+                      <a:pPr algn="l" fontAlgn="b"/>
+                      <a:r>
+                        <a:rPr lang="en-US" sz="600" u="none" strike="noStrike">
+                          <a:effectLst/>
+                        </a:rPr>
+                        <a:t>Done</a:t>
+                      </a:r>
+                      <a:endParaRPr lang="en-US" sz="600" b="0" i="0" u="none" strike="noStrike">
+                        <a:solidFill>
+                          <a:srgbClr val="000000"/>
+                        </a:solidFill>
+                        <a:effectLst/>
+                        <a:latin typeface="Calibri"/>
+                      </a:endParaRPr>
+                    </a:p>
+                  </a:txBody>
+                  <a:tcPr marL="5627" marR="5627" marT="5627" marB="0" anchor="b"/>
+                </a:tc>
+                <a:tc>
+                  <a:txBody>
+                    <a:bodyPr/>
+                    <a:lstStyle/>
+                    <a:p>
+                      <a:pPr algn="r" fontAlgn="b"/>
+                      <a:r>
+                        <a:rPr lang="en-US" sz="600" u="none" strike="noStrike">
+                          <a:effectLst/>
+                        </a:rPr>
+                        <a:t>25</a:t>
+                      </a:r>
+                      <a:endParaRPr lang="en-US" sz="600" b="0" i="0" u="none" strike="noStrike">
+                        <a:solidFill>
+                          <a:srgbClr val="000000"/>
+                        </a:solidFill>
+                        <a:effectLst/>
+                        <a:latin typeface="Calibri"/>
+                      </a:endParaRPr>
+                    </a:p>
+                  </a:txBody>
+                  <a:tcPr marL="5627" marR="5627" marT="5627" marB="0" anchor="b"/>
+                </a:tc>
+                <a:tc>
+                  <a:txBody>
+                    <a:bodyPr/>
+                    <a:lstStyle/>
+                    <a:p>
+                      <a:pPr algn="r" fontAlgn="b"/>
+                      <a:r>
+                        <a:rPr lang="en-US" sz="600" u="none" strike="noStrike">
+                          <a:effectLst/>
+                        </a:rPr>
+                        <a:t>20</a:t>
+                      </a:r>
+                      <a:endParaRPr lang="en-US" sz="600" b="0" i="0" u="none" strike="noStrike">
+                        <a:solidFill>
+                          <a:srgbClr val="000000"/>
+                        </a:solidFill>
+                        <a:effectLst/>
+                        <a:latin typeface="Calibri"/>
+                      </a:endParaRPr>
+                    </a:p>
+                  </a:txBody>
+                  <a:tcPr marL="5627" marR="5627" marT="5627" marB="0" anchor="b"/>
+                </a:tc>
+                <a:tc>
+                  <a:txBody>
+                    <a:bodyPr/>
+                    <a:lstStyle/>
+                    <a:p>
+                      <a:pPr algn="r" fontAlgn="b"/>
+                      <a:r>
+                        <a:rPr lang="en-US" sz="600" u="none" strike="noStrike">
+                          <a:effectLst/>
+                        </a:rPr>
+                        <a:t>5</a:t>
+                      </a:r>
+                      <a:endParaRPr lang="en-US" sz="600" b="0" i="0" u="none" strike="noStrike">
+                        <a:solidFill>
+                          <a:srgbClr val="000000"/>
+                        </a:solidFill>
+                        <a:effectLst/>
+                        <a:latin typeface="Calibri"/>
+                      </a:endParaRPr>
+                    </a:p>
+                  </a:txBody>
+                  <a:tcPr marL="5627" marR="5627" marT="5627" marB="0" anchor="b"/>
+                </a:tc>
+              </a:tr>
+              <a:tr h="121463">
+                <a:tc>
+                  <a:txBody>
+                    <a:bodyPr/>
+                    <a:lstStyle/>
+                    <a:p>
+                      <a:pPr algn="r" fontAlgn="b"/>
+                      <a:r>
+                        <a:rPr lang="en-US" sz="600" u="none" strike="noStrike">
+                          <a:effectLst/>
+                        </a:rPr>
+                        <a:t>18-Nov</a:t>
+                      </a:r>
+                      <a:endParaRPr lang="en-US" sz="600" b="0" i="0" u="none" strike="noStrike">
+                        <a:solidFill>
+                          <a:srgbClr val="000000"/>
+                        </a:solidFill>
+                        <a:effectLst/>
+                        <a:latin typeface="Calibri"/>
+                      </a:endParaRPr>
+                    </a:p>
+                  </a:txBody>
+                  <a:tcPr marL="5627" marR="5627" marT="5627" marB="0" anchor="b"/>
+                </a:tc>
+                <a:tc>
+                  <a:txBody>
+                    <a:bodyPr/>
+                    <a:lstStyle/>
+                    <a:p>
+                      <a:pPr algn="r" fontAlgn="b"/>
+                      <a:r>
+                        <a:rPr lang="en-US" sz="600" u="none" strike="noStrike">
+                          <a:effectLst/>
+                        </a:rPr>
                         <a:t>3</a:t>
                       </a:r>
                       <a:endParaRPr lang="en-US" sz="600" b="0" i="0" u="none" strike="noStrike">
                         <a:solidFill>
-                          <a:srgbClr val="9C6500"/>
+                          <a:srgbClr val="000000"/>
+                        </a:solidFill>
+                        <a:effectLst/>
+                        <a:latin typeface="Calibri"/>
+                      </a:endParaRPr>
+                    </a:p>
+                  </a:txBody>
+                  <a:tcPr marL="5627" marR="5627" marT="5627" marB="0" anchor="b"/>
+                </a:tc>
+                <a:tc>
+                  <a:txBody>
+                    <a:bodyPr/>
+                    <a:lstStyle/>
+                    <a:p>
+                      <a:pPr algn="l" fontAlgn="b"/>
+                      <a:r>
+                        <a:rPr lang="en-US" sz="600" u="none" strike="noStrike">
+                          <a:effectLst/>
+                        </a:rPr>
+                        <a:t>Review Feedback</a:t>
+                      </a:r>
+                      <a:endParaRPr lang="en-US" sz="600" b="0" i="0" u="none" strike="noStrike">
+                        <a:solidFill>
+                          <a:srgbClr val="000000"/>
                         </a:solidFill>
                         <a:effectLst/>
                         <a:latin typeface="Calibri"/>
@@ -12419,44 +12906,1435 @@
                       </a:r>
                       <a:endParaRPr lang="en-US" sz="600" b="0" i="0" u="none" strike="noStrike">
                         <a:solidFill>
-                          <a:srgbClr val="9C6500"/>
-                        </a:solidFill>
-                        <a:effectLst/>
-                        <a:latin typeface="Calibri"/>
-                      </a:endParaRPr>
-                    </a:p>
-                  </a:txBody>
-                  <a:tcPr marL="5627" marR="5627" marT="5627" marB="0" anchor="b"/>
-                </a:tc>
-                <a:tc>
-                  <a:txBody>
-                    <a:bodyPr/>
-                    <a:lstStyle/>
-                    <a:p>
-                      <a:pPr algn="r" fontAlgn="b"/>
-                      <a:r>
-                        <a:rPr lang="en-US" sz="600" u="none" strike="noStrike">
-                          <a:effectLst/>
-                        </a:rPr>
-                        <a:t>3</a:t>
-                      </a:r>
-                      <a:endParaRPr lang="en-US" sz="600" b="0" i="0" u="none" strike="noStrike">
-                        <a:solidFill>
-                          <a:srgbClr val="9C6500"/>
-                        </a:solidFill>
-                        <a:effectLst/>
-                        <a:latin typeface="Calibri"/>
-                      </a:endParaRPr>
-                    </a:p>
-                  </a:txBody>
-                  <a:tcPr marL="5627" marR="5627" marT="5627" marB="0" anchor="b"/>
-                </a:tc>
-                <a:tc>
-                  <a:txBody>
-                    <a:bodyPr/>
-                    <a:lstStyle/>
-                    <a:p>
-                      <a:pPr algn="l" fontAlgn="b"/>
+                          <a:srgbClr val="000000"/>
+                        </a:solidFill>
+                        <a:effectLst/>
+                        <a:latin typeface="Calibri"/>
+                      </a:endParaRPr>
+                    </a:p>
+                  </a:txBody>
+                  <a:tcPr marL="5627" marR="5627" marT="5627" marB="0" anchor="b"/>
+                </a:tc>
+                <a:tc>
+                  <a:txBody>
+                    <a:bodyPr/>
+                    <a:lstStyle/>
+                    <a:p>
+                      <a:pPr algn="l" fontAlgn="b"/>
+                      <a:r>
+                        <a:rPr lang="en-US" sz="600" u="none" strike="noStrike">
+                          <a:effectLst/>
+                        </a:rPr>
+                        <a:t>Team</a:t>
+                      </a:r>
+                      <a:endParaRPr lang="en-US" sz="600" b="0" i="0" u="none" strike="noStrike">
+                        <a:solidFill>
+                          <a:srgbClr val="000000"/>
+                        </a:solidFill>
+                        <a:effectLst/>
+                        <a:latin typeface="Calibri"/>
+                      </a:endParaRPr>
+                    </a:p>
+                  </a:txBody>
+                  <a:tcPr marL="5627" marR="5627" marT="5627" marB="0" anchor="b"/>
+                </a:tc>
+                <a:tc>
+                  <a:txBody>
+                    <a:bodyPr/>
+                    <a:lstStyle/>
+                    <a:p>
+                      <a:pPr algn="r" fontAlgn="b"/>
+                      <a:r>
+                        <a:rPr lang="en-US" sz="600" u="none" strike="noStrike">
+                          <a:effectLst/>
+                        </a:rPr>
+                        <a:t>2</a:t>
+                      </a:r>
+                      <a:endParaRPr lang="en-US" sz="600" b="0" i="0" u="none" strike="noStrike">
+                        <a:solidFill>
+                          <a:srgbClr val="000000"/>
+                        </a:solidFill>
+                        <a:effectLst/>
+                        <a:latin typeface="Calibri"/>
+                      </a:endParaRPr>
+                    </a:p>
+                  </a:txBody>
+                  <a:tcPr marL="5627" marR="5627" marT="5627" marB="0" anchor="b"/>
+                </a:tc>
+                <a:tc>
+                  <a:txBody>
+                    <a:bodyPr/>
+                    <a:lstStyle/>
+                    <a:p>
+                      <a:pPr algn="r" fontAlgn="b"/>
+                      <a:r>
+                        <a:rPr lang="en-US" sz="600" u="none" strike="noStrike">
+                          <a:effectLst/>
+                        </a:rPr>
+                        <a:t>2</a:t>
+                      </a:r>
+                      <a:endParaRPr lang="en-US" sz="600" b="0" i="0" u="none" strike="noStrike">
+                        <a:solidFill>
+                          <a:srgbClr val="000000"/>
+                        </a:solidFill>
+                        <a:effectLst/>
+                        <a:latin typeface="Calibri"/>
+                      </a:endParaRPr>
+                    </a:p>
+                  </a:txBody>
+                  <a:tcPr marL="5627" marR="5627" marT="5627" marB="0" anchor="b"/>
+                </a:tc>
+                <a:tc>
+                  <a:txBody>
+                    <a:bodyPr/>
+                    <a:lstStyle/>
+                    <a:p>
+                      <a:pPr algn="r" fontAlgn="b"/>
+                      <a:r>
+                        <a:rPr lang="en-US" sz="600" u="none" strike="noStrike">
+                          <a:effectLst/>
+                        </a:rPr>
+                        <a:t>0</a:t>
+                      </a:r>
+                      <a:endParaRPr lang="en-US" sz="600" b="0" i="0" u="none" strike="noStrike">
+                        <a:solidFill>
+                          <a:srgbClr val="000000"/>
+                        </a:solidFill>
+                        <a:effectLst/>
+                        <a:latin typeface="Calibri"/>
+                      </a:endParaRPr>
+                    </a:p>
+                  </a:txBody>
+                  <a:tcPr marL="5627" marR="5627" marT="5627" marB="0" anchor="b"/>
+                </a:tc>
+                <a:tc>
+                  <a:txBody>
+                    <a:bodyPr/>
+                    <a:lstStyle/>
+                    <a:p>
+                      <a:pPr algn="l" fontAlgn="b"/>
+                      <a:r>
+                        <a:rPr lang="en-US" sz="600" u="none" strike="noStrike">
+                          <a:effectLst/>
+                        </a:rPr>
+                        <a:t>Done</a:t>
+                      </a:r>
+                      <a:endParaRPr lang="en-US" sz="600" b="0" i="0" u="none" strike="noStrike">
+                        <a:solidFill>
+                          <a:srgbClr val="000000"/>
+                        </a:solidFill>
+                        <a:effectLst/>
+                        <a:latin typeface="Calibri"/>
+                      </a:endParaRPr>
+                    </a:p>
+                  </a:txBody>
+                  <a:tcPr marL="5627" marR="5627" marT="5627" marB="0" anchor="b"/>
+                </a:tc>
+                <a:tc>
+                  <a:txBody>
+                    <a:bodyPr/>
+                    <a:lstStyle/>
+                    <a:p>
+                      <a:pPr algn="l" fontAlgn="b"/>
+                      <a:endParaRPr lang="en-US" sz="600" b="0" i="0" u="none" strike="noStrike">
+                        <a:solidFill>
+                          <a:srgbClr val="000000"/>
+                        </a:solidFill>
+                        <a:effectLst/>
+                        <a:latin typeface="Calibri"/>
+                      </a:endParaRPr>
+                    </a:p>
+                  </a:txBody>
+                  <a:tcPr marL="5627" marR="5627" marT="5627" marB="0" anchor="b"/>
+                </a:tc>
+                <a:tc>
+                  <a:txBody>
+                    <a:bodyPr/>
+                    <a:lstStyle/>
+                    <a:p>
+                      <a:pPr algn="l" fontAlgn="b"/>
+                      <a:endParaRPr lang="en-US" sz="600" b="0" i="0" u="none" strike="noStrike">
+                        <a:solidFill>
+                          <a:srgbClr val="000000"/>
+                        </a:solidFill>
+                        <a:effectLst/>
+                        <a:latin typeface="Calibri"/>
+                      </a:endParaRPr>
+                    </a:p>
+                  </a:txBody>
+                  <a:tcPr marL="5627" marR="5627" marT="5627" marB="0" anchor="b"/>
+                </a:tc>
+                <a:tc>
+                  <a:txBody>
+                    <a:bodyPr/>
+                    <a:lstStyle/>
+                    <a:p>
+                      <a:pPr algn="l" fontAlgn="b"/>
+                      <a:endParaRPr lang="en-US" sz="600" b="0" i="0" u="none" strike="noStrike">
+                        <a:solidFill>
+                          <a:srgbClr val="000000"/>
+                        </a:solidFill>
+                        <a:effectLst/>
+                        <a:latin typeface="Calibri"/>
+                      </a:endParaRPr>
+                    </a:p>
+                  </a:txBody>
+                  <a:tcPr marL="5627" marR="5627" marT="5627" marB="0" anchor="b"/>
+                </a:tc>
+              </a:tr>
+              <a:tr h="121463">
+                <a:tc>
+                  <a:txBody>
+                    <a:bodyPr/>
+                    <a:lstStyle/>
+                    <a:p>
+                      <a:pPr algn="l" fontAlgn="b"/>
+                      <a:r>
+                        <a:rPr lang="en-US" sz="600" u="none" strike="noStrike">
+                          <a:effectLst/>
+                        </a:rPr>
+                        <a:t> </a:t>
+                      </a:r>
+                      <a:endParaRPr lang="en-US" sz="600" b="0" i="0" u="none" strike="noStrike">
+                        <a:solidFill>
+                          <a:srgbClr val="000000"/>
+                        </a:solidFill>
+                        <a:effectLst/>
+                        <a:latin typeface="Calibri"/>
+                      </a:endParaRPr>
+                    </a:p>
+                  </a:txBody>
+                  <a:tcPr marL="5627" marR="5627" marT="5627" marB="0" anchor="b"/>
+                </a:tc>
+                <a:tc>
+                  <a:txBody>
+                    <a:bodyPr/>
+                    <a:lstStyle/>
+                    <a:p>
+                      <a:pPr algn="l" fontAlgn="b"/>
+                      <a:r>
+                        <a:rPr lang="en-US" sz="600" u="none" strike="noStrike">
+                          <a:effectLst/>
+                        </a:rPr>
+                        <a:t> </a:t>
+                      </a:r>
+                      <a:endParaRPr lang="en-US" sz="600" b="0" i="0" u="none" strike="noStrike">
+                        <a:solidFill>
+                          <a:srgbClr val="000000"/>
+                        </a:solidFill>
+                        <a:effectLst/>
+                        <a:latin typeface="Calibri"/>
+                      </a:endParaRPr>
+                    </a:p>
+                  </a:txBody>
+                  <a:tcPr marL="5627" marR="5627" marT="5627" marB="0" anchor="b"/>
+                </a:tc>
+                <a:tc>
+                  <a:txBody>
+                    <a:bodyPr/>
+                    <a:lstStyle/>
+                    <a:p>
+                      <a:pPr algn="l" fontAlgn="b"/>
+                      <a:r>
+                        <a:rPr lang="en-US" sz="600" u="none" strike="noStrike">
+                          <a:effectLst/>
+                        </a:rPr>
+                        <a:t>Implement Feedback</a:t>
+                      </a:r>
+                      <a:endParaRPr lang="en-US" sz="600" b="0" i="0" u="none" strike="noStrike">
+                        <a:solidFill>
+                          <a:srgbClr val="000000"/>
+                        </a:solidFill>
+                        <a:effectLst/>
+                        <a:latin typeface="Calibri"/>
+                      </a:endParaRPr>
+                    </a:p>
+                  </a:txBody>
+                  <a:tcPr marL="5627" marR="5627" marT="5627" marB="0" anchor="b"/>
+                </a:tc>
+                <a:tc>
+                  <a:txBody>
+                    <a:bodyPr/>
+                    <a:lstStyle/>
+                    <a:p>
+                      <a:pPr algn="l" fontAlgn="b"/>
+                      <a:r>
+                        <a:rPr lang="en-US" sz="600" u="none" strike="noStrike">
+                          <a:effectLst/>
+                        </a:rPr>
+                        <a:t> </a:t>
+                      </a:r>
+                      <a:endParaRPr lang="en-US" sz="600" b="0" i="0" u="none" strike="noStrike">
+                        <a:solidFill>
+                          <a:srgbClr val="000000"/>
+                        </a:solidFill>
+                        <a:effectLst/>
+                        <a:latin typeface="Calibri"/>
+                      </a:endParaRPr>
+                    </a:p>
+                  </a:txBody>
+                  <a:tcPr marL="5627" marR="5627" marT="5627" marB="0" anchor="b"/>
+                </a:tc>
+                <a:tc>
+                  <a:txBody>
+                    <a:bodyPr/>
+                    <a:lstStyle/>
+                    <a:p>
+                      <a:pPr algn="l" fontAlgn="b"/>
+                      <a:r>
+                        <a:rPr lang="en-US" sz="600" u="none" strike="noStrike">
+                          <a:effectLst/>
+                        </a:rPr>
+                        <a:t>Team</a:t>
+                      </a:r>
+                      <a:endParaRPr lang="en-US" sz="600" b="0" i="0" u="none" strike="noStrike">
+                        <a:solidFill>
+                          <a:srgbClr val="000000"/>
+                        </a:solidFill>
+                        <a:effectLst/>
+                        <a:latin typeface="Calibri"/>
+                      </a:endParaRPr>
+                    </a:p>
+                  </a:txBody>
+                  <a:tcPr marL="5627" marR="5627" marT="5627" marB="0" anchor="b"/>
+                </a:tc>
+                <a:tc>
+                  <a:txBody>
+                    <a:bodyPr/>
+                    <a:lstStyle/>
+                    <a:p>
+                      <a:pPr algn="r" fontAlgn="b"/>
+                      <a:r>
+                        <a:rPr lang="en-US" sz="600" u="none" strike="noStrike">
+                          <a:effectLst/>
+                        </a:rPr>
+                        <a:t>2</a:t>
+                      </a:r>
+                      <a:endParaRPr lang="en-US" sz="600" b="0" i="0" u="none" strike="noStrike">
+                        <a:solidFill>
+                          <a:srgbClr val="000000"/>
+                        </a:solidFill>
+                        <a:effectLst/>
+                        <a:latin typeface="Calibri"/>
+                      </a:endParaRPr>
+                    </a:p>
+                  </a:txBody>
+                  <a:tcPr marL="5627" marR="5627" marT="5627" marB="0" anchor="b"/>
+                </a:tc>
+                <a:tc>
+                  <a:txBody>
+                    <a:bodyPr/>
+                    <a:lstStyle/>
+                    <a:p>
+                      <a:pPr algn="r" fontAlgn="b"/>
+                      <a:r>
+                        <a:rPr lang="en-US" sz="600" u="none" strike="noStrike">
+                          <a:effectLst/>
+                        </a:rPr>
+                        <a:t>2</a:t>
+                      </a:r>
+                      <a:endParaRPr lang="en-US" sz="600" b="0" i="0" u="none" strike="noStrike">
+                        <a:solidFill>
+                          <a:srgbClr val="000000"/>
+                        </a:solidFill>
+                        <a:effectLst/>
+                        <a:latin typeface="Calibri"/>
+                      </a:endParaRPr>
+                    </a:p>
+                  </a:txBody>
+                  <a:tcPr marL="5627" marR="5627" marT="5627" marB="0" anchor="b"/>
+                </a:tc>
+                <a:tc>
+                  <a:txBody>
+                    <a:bodyPr/>
+                    <a:lstStyle/>
+                    <a:p>
+                      <a:pPr algn="r" fontAlgn="b"/>
+                      <a:r>
+                        <a:rPr lang="en-US" sz="600" u="none" strike="noStrike">
+                          <a:effectLst/>
+                        </a:rPr>
+                        <a:t>0</a:t>
+                      </a:r>
+                      <a:endParaRPr lang="en-US" sz="600" b="0" i="0" u="none" strike="noStrike">
+                        <a:solidFill>
+                          <a:srgbClr val="000000"/>
+                        </a:solidFill>
+                        <a:effectLst/>
+                        <a:latin typeface="Calibri"/>
+                      </a:endParaRPr>
+                    </a:p>
+                  </a:txBody>
+                  <a:tcPr marL="5627" marR="5627" marT="5627" marB="0" anchor="b"/>
+                </a:tc>
+                <a:tc>
+                  <a:txBody>
+                    <a:bodyPr/>
+                    <a:lstStyle/>
+                    <a:p>
+                      <a:pPr algn="l" fontAlgn="b"/>
+                      <a:r>
+                        <a:rPr lang="en-US" sz="600" u="none" strike="noStrike">
+                          <a:effectLst/>
+                        </a:rPr>
+                        <a:t>Done</a:t>
+                      </a:r>
+                      <a:endParaRPr lang="en-US" sz="600" b="0" i="0" u="none" strike="noStrike">
+                        <a:solidFill>
+                          <a:srgbClr val="000000"/>
+                        </a:solidFill>
+                        <a:effectLst/>
+                        <a:latin typeface="Calibri"/>
+                      </a:endParaRPr>
+                    </a:p>
+                  </a:txBody>
+                  <a:tcPr marL="5627" marR="5627" marT="5627" marB="0" anchor="b"/>
+                </a:tc>
+                <a:tc>
+                  <a:txBody>
+                    <a:bodyPr/>
+                    <a:lstStyle/>
+                    <a:p>
+                      <a:pPr algn="l" fontAlgn="b"/>
+                      <a:endParaRPr lang="en-US" sz="600" b="0" i="0" u="none" strike="noStrike">
+                        <a:solidFill>
+                          <a:srgbClr val="000000"/>
+                        </a:solidFill>
+                        <a:effectLst/>
+                        <a:latin typeface="Calibri"/>
+                      </a:endParaRPr>
+                    </a:p>
+                  </a:txBody>
+                  <a:tcPr marL="5627" marR="5627" marT="5627" marB="0" anchor="b"/>
+                </a:tc>
+                <a:tc>
+                  <a:txBody>
+                    <a:bodyPr/>
+                    <a:lstStyle/>
+                    <a:p>
+                      <a:pPr algn="l" fontAlgn="b"/>
+                      <a:endParaRPr lang="en-US" sz="600" b="0" i="0" u="none" strike="noStrike">
+                        <a:solidFill>
+                          <a:srgbClr val="000000"/>
+                        </a:solidFill>
+                        <a:effectLst/>
+                        <a:latin typeface="Calibri"/>
+                      </a:endParaRPr>
+                    </a:p>
+                  </a:txBody>
+                  <a:tcPr marL="5627" marR="5627" marT="5627" marB="0" anchor="b"/>
+                </a:tc>
+                <a:tc>
+                  <a:txBody>
+                    <a:bodyPr/>
+                    <a:lstStyle/>
+                    <a:p>
+                      <a:pPr algn="l" fontAlgn="b"/>
+                      <a:endParaRPr lang="en-US" sz="600" b="0" i="0" u="none" strike="noStrike">
+                        <a:solidFill>
+                          <a:srgbClr val="000000"/>
+                        </a:solidFill>
+                        <a:effectLst/>
+                        <a:latin typeface="Calibri"/>
+                      </a:endParaRPr>
+                    </a:p>
+                  </a:txBody>
+                  <a:tcPr marL="5627" marR="5627" marT="5627" marB="0" anchor="b"/>
+                </a:tc>
+              </a:tr>
+              <a:tr h="121463">
+                <a:tc>
+                  <a:txBody>
+                    <a:bodyPr/>
+                    <a:lstStyle/>
+                    <a:p>
+                      <a:pPr algn="l" fontAlgn="b"/>
+                      <a:r>
+                        <a:rPr lang="en-US" sz="600" u="none" strike="noStrike">
+                          <a:effectLst/>
+                        </a:rPr>
+                        <a:t> </a:t>
+                      </a:r>
+                      <a:endParaRPr lang="en-US" sz="600" b="0" i="0" u="none" strike="noStrike">
+                        <a:solidFill>
+                          <a:srgbClr val="000000"/>
+                        </a:solidFill>
+                        <a:effectLst/>
+                        <a:latin typeface="Calibri"/>
+                      </a:endParaRPr>
+                    </a:p>
+                  </a:txBody>
+                  <a:tcPr marL="5627" marR="5627" marT="5627" marB="0" anchor="b"/>
+                </a:tc>
+                <a:tc>
+                  <a:txBody>
+                    <a:bodyPr/>
+                    <a:lstStyle/>
+                    <a:p>
+                      <a:pPr algn="l" fontAlgn="b"/>
+                      <a:r>
+                        <a:rPr lang="en-US" sz="600" u="none" strike="noStrike">
+                          <a:effectLst/>
+                        </a:rPr>
+                        <a:t> </a:t>
+                      </a:r>
+                      <a:endParaRPr lang="en-US" sz="600" b="0" i="0" u="none" strike="noStrike">
+                        <a:solidFill>
+                          <a:srgbClr val="000000"/>
+                        </a:solidFill>
+                        <a:effectLst/>
+                        <a:latin typeface="Calibri"/>
+                      </a:endParaRPr>
+                    </a:p>
+                  </a:txBody>
+                  <a:tcPr marL="5627" marR="5627" marT="5627" marB="0" anchor="b"/>
+                </a:tc>
+                <a:tc>
+                  <a:txBody>
+                    <a:bodyPr/>
+                    <a:lstStyle/>
+                    <a:p>
+                      <a:pPr algn="l" fontAlgn="b"/>
+                      <a:r>
+                        <a:rPr lang="en-US" sz="600" u="none" strike="noStrike">
+                          <a:effectLst/>
+                        </a:rPr>
+                        <a:t>Sprint Story Creation</a:t>
+                      </a:r>
+                      <a:endParaRPr lang="en-US" sz="600" b="0" i="0" u="none" strike="noStrike">
+                        <a:solidFill>
+                          <a:srgbClr val="000000"/>
+                        </a:solidFill>
+                        <a:effectLst/>
+                        <a:latin typeface="Calibri"/>
+                      </a:endParaRPr>
+                    </a:p>
+                  </a:txBody>
+                  <a:tcPr marL="5627" marR="5627" marT="5627" marB="0" anchor="b"/>
+                </a:tc>
+                <a:tc>
+                  <a:txBody>
+                    <a:bodyPr/>
+                    <a:lstStyle/>
+                    <a:p>
+                      <a:pPr algn="l" fontAlgn="b"/>
+                      <a:r>
+                        <a:rPr lang="en-US" sz="600" u="none" strike="noStrike">
+                          <a:effectLst/>
+                        </a:rPr>
+                        <a:t>Implementation</a:t>
+                      </a:r>
+                      <a:endParaRPr lang="en-US" sz="600" b="0" i="0" u="none" strike="noStrike">
+                        <a:solidFill>
+                          <a:srgbClr val="000000"/>
+                        </a:solidFill>
+                        <a:effectLst/>
+                        <a:latin typeface="Calibri"/>
+                      </a:endParaRPr>
+                    </a:p>
+                  </a:txBody>
+                  <a:tcPr marL="5627" marR="5627" marT="5627" marB="0" anchor="b"/>
+                </a:tc>
+                <a:tc>
+                  <a:txBody>
+                    <a:bodyPr/>
+                    <a:lstStyle/>
+                    <a:p>
+                      <a:pPr algn="l" fontAlgn="b"/>
+                      <a:r>
+                        <a:rPr lang="en-US" sz="600" u="none" strike="noStrike" dirty="0">
+                          <a:effectLst/>
+                        </a:rPr>
+                        <a:t> </a:t>
+                      </a:r>
+                      <a:r>
+                        <a:rPr lang="en-US" sz="600" u="none" strike="noStrike" dirty="0" smtClean="0">
+                          <a:effectLst/>
+                        </a:rPr>
+                        <a:t>Dan</a:t>
+                      </a:r>
+                      <a:endParaRPr lang="en-US" sz="600" b="0" i="0" u="none" strike="noStrike" dirty="0">
+                        <a:solidFill>
+                          <a:srgbClr val="000000"/>
+                        </a:solidFill>
+                        <a:effectLst/>
+                        <a:latin typeface="Calibri"/>
+                      </a:endParaRPr>
+                    </a:p>
+                  </a:txBody>
+                  <a:tcPr marL="5627" marR="5627" marT="5627" marB="0" anchor="b"/>
+                </a:tc>
+                <a:tc>
+                  <a:txBody>
+                    <a:bodyPr/>
+                    <a:lstStyle/>
+                    <a:p>
+                      <a:pPr algn="r" fontAlgn="b"/>
+                      <a:r>
+                        <a:rPr lang="en-US" sz="600" u="none" strike="noStrike">
+                          <a:effectLst/>
+                        </a:rPr>
+                        <a:t>4</a:t>
+                      </a:r>
+                      <a:endParaRPr lang="en-US" sz="600" b="0" i="0" u="none" strike="noStrike">
+                        <a:solidFill>
+                          <a:srgbClr val="000000"/>
+                        </a:solidFill>
+                        <a:effectLst/>
+                        <a:latin typeface="Calibri"/>
+                      </a:endParaRPr>
+                    </a:p>
+                  </a:txBody>
+                  <a:tcPr marL="5627" marR="5627" marT="5627" marB="0" anchor="b"/>
+                </a:tc>
+                <a:tc>
+                  <a:txBody>
+                    <a:bodyPr/>
+                    <a:lstStyle/>
+                    <a:p>
+                      <a:pPr algn="r" fontAlgn="b"/>
+                      <a:r>
+                        <a:rPr lang="en-US" sz="600" u="none" strike="noStrike">
+                          <a:effectLst/>
+                        </a:rPr>
+                        <a:t>4</a:t>
+                      </a:r>
+                      <a:endParaRPr lang="en-US" sz="600" b="0" i="0" u="none" strike="noStrike">
+                        <a:solidFill>
+                          <a:srgbClr val="000000"/>
+                        </a:solidFill>
+                        <a:effectLst/>
+                        <a:latin typeface="Calibri"/>
+                      </a:endParaRPr>
+                    </a:p>
+                  </a:txBody>
+                  <a:tcPr marL="5627" marR="5627" marT="5627" marB="0" anchor="b"/>
+                </a:tc>
+                <a:tc>
+                  <a:txBody>
+                    <a:bodyPr/>
+                    <a:lstStyle/>
+                    <a:p>
+                      <a:pPr algn="r" fontAlgn="b"/>
+                      <a:r>
+                        <a:rPr lang="en-US" sz="600" u="none" strike="noStrike">
+                          <a:effectLst/>
+                        </a:rPr>
+                        <a:t>0</a:t>
+                      </a:r>
+                      <a:endParaRPr lang="en-US" sz="600" b="0" i="0" u="none" strike="noStrike">
+                        <a:solidFill>
+                          <a:srgbClr val="000000"/>
+                        </a:solidFill>
+                        <a:effectLst/>
+                        <a:latin typeface="Calibri"/>
+                      </a:endParaRPr>
+                    </a:p>
+                  </a:txBody>
+                  <a:tcPr marL="5627" marR="5627" marT="5627" marB="0" anchor="b"/>
+                </a:tc>
+                <a:tc>
+                  <a:txBody>
+                    <a:bodyPr/>
+                    <a:lstStyle/>
+                    <a:p>
+                      <a:pPr algn="l" fontAlgn="b"/>
+                      <a:r>
+                        <a:rPr lang="en-US" sz="600" u="none" strike="noStrike">
+                          <a:effectLst/>
+                        </a:rPr>
+                        <a:t>Done</a:t>
+                      </a:r>
+                      <a:endParaRPr lang="en-US" sz="600" b="0" i="0" u="none" strike="noStrike">
+                        <a:solidFill>
+                          <a:srgbClr val="000000"/>
+                        </a:solidFill>
+                        <a:effectLst/>
+                        <a:latin typeface="Calibri"/>
+                      </a:endParaRPr>
+                    </a:p>
+                  </a:txBody>
+                  <a:tcPr marL="5627" marR="5627" marT="5627" marB="0" anchor="b"/>
+                </a:tc>
+                <a:tc>
+                  <a:txBody>
+                    <a:bodyPr/>
+                    <a:lstStyle/>
+                    <a:p>
+                      <a:pPr algn="l" fontAlgn="b"/>
+                      <a:endParaRPr lang="en-US" sz="600" b="0" i="0" u="none" strike="noStrike">
+                        <a:solidFill>
+                          <a:srgbClr val="000000"/>
+                        </a:solidFill>
+                        <a:effectLst/>
+                        <a:latin typeface="Calibri"/>
+                      </a:endParaRPr>
+                    </a:p>
+                  </a:txBody>
+                  <a:tcPr marL="5627" marR="5627" marT="5627" marB="0" anchor="b"/>
+                </a:tc>
+                <a:tc>
+                  <a:txBody>
+                    <a:bodyPr/>
+                    <a:lstStyle/>
+                    <a:p>
+                      <a:pPr algn="l" fontAlgn="b"/>
+                      <a:endParaRPr lang="en-US" sz="600" b="0" i="0" u="none" strike="noStrike">
+                        <a:solidFill>
+                          <a:srgbClr val="000000"/>
+                        </a:solidFill>
+                        <a:effectLst/>
+                        <a:latin typeface="Calibri"/>
+                      </a:endParaRPr>
+                    </a:p>
+                  </a:txBody>
+                  <a:tcPr marL="5627" marR="5627" marT="5627" marB="0" anchor="b"/>
+                </a:tc>
+                <a:tc>
+                  <a:txBody>
+                    <a:bodyPr/>
+                    <a:lstStyle/>
+                    <a:p>
+                      <a:pPr algn="l" fontAlgn="b"/>
+                      <a:endParaRPr lang="en-US" sz="600" b="0" i="0" u="none" strike="noStrike">
+                        <a:solidFill>
+                          <a:srgbClr val="000000"/>
+                        </a:solidFill>
+                        <a:effectLst/>
+                        <a:latin typeface="Calibri"/>
+                      </a:endParaRPr>
+                    </a:p>
+                  </a:txBody>
+                  <a:tcPr marL="5627" marR="5627" marT="5627" marB="0" anchor="b"/>
+                </a:tc>
+              </a:tr>
+              <a:tr h="121463">
+                <a:tc>
+                  <a:txBody>
+                    <a:bodyPr/>
+                    <a:lstStyle/>
+                    <a:p>
+                      <a:pPr algn="l" fontAlgn="b"/>
+                      <a:r>
+                        <a:rPr lang="en-US" sz="600" u="none" strike="noStrike">
+                          <a:effectLst/>
+                        </a:rPr>
+                        <a:t> </a:t>
+                      </a:r>
+                      <a:endParaRPr lang="en-US" sz="600" b="0" i="0" u="none" strike="noStrike">
+                        <a:solidFill>
+                          <a:srgbClr val="000000"/>
+                        </a:solidFill>
+                        <a:effectLst/>
+                        <a:latin typeface="Calibri"/>
+                      </a:endParaRPr>
+                    </a:p>
+                  </a:txBody>
+                  <a:tcPr marL="5627" marR="5627" marT="5627" marB="0" anchor="b"/>
+                </a:tc>
+                <a:tc>
+                  <a:txBody>
+                    <a:bodyPr/>
+                    <a:lstStyle/>
+                    <a:p>
+                      <a:pPr algn="l" fontAlgn="b"/>
+                      <a:r>
+                        <a:rPr lang="en-US" sz="600" u="none" strike="noStrike">
+                          <a:effectLst/>
+                        </a:rPr>
+                        <a:t> </a:t>
+                      </a:r>
+                      <a:endParaRPr lang="en-US" sz="600" b="0" i="0" u="none" strike="noStrike">
+                        <a:solidFill>
+                          <a:srgbClr val="000000"/>
+                        </a:solidFill>
+                        <a:effectLst/>
+                        <a:latin typeface="Calibri"/>
+                      </a:endParaRPr>
+                    </a:p>
+                  </a:txBody>
+                  <a:tcPr marL="5627" marR="5627" marT="5627" marB="0" anchor="b"/>
+                </a:tc>
+                <a:tc>
+                  <a:txBody>
+                    <a:bodyPr/>
+                    <a:lstStyle/>
+                    <a:p>
+                      <a:pPr algn="l" fontAlgn="b"/>
+                      <a:r>
+                        <a:rPr lang="en-US" sz="600" u="none" strike="noStrike">
+                          <a:effectLst/>
+                        </a:rPr>
+                        <a:t>Sprint Story Management</a:t>
+                      </a:r>
+                      <a:endParaRPr lang="en-US" sz="600" b="0" i="0" u="none" strike="noStrike">
+                        <a:solidFill>
+                          <a:srgbClr val="000000"/>
+                        </a:solidFill>
+                        <a:effectLst/>
+                        <a:latin typeface="Calibri"/>
+                      </a:endParaRPr>
+                    </a:p>
+                  </a:txBody>
+                  <a:tcPr marL="5627" marR="5627" marT="5627" marB="0" anchor="b"/>
+                </a:tc>
+                <a:tc>
+                  <a:txBody>
+                    <a:bodyPr/>
+                    <a:lstStyle/>
+                    <a:p>
+                      <a:pPr algn="l" fontAlgn="b"/>
+                      <a:r>
+                        <a:rPr lang="en-US" sz="600" u="none" strike="noStrike">
+                          <a:effectLst/>
+                        </a:rPr>
+                        <a:t>Implementation</a:t>
+                      </a:r>
+                      <a:endParaRPr lang="en-US" sz="600" b="0" i="0" u="none" strike="noStrike">
+                        <a:solidFill>
+                          <a:srgbClr val="000000"/>
+                        </a:solidFill>
+                        <a:effectLst/>
+                        <a:latin typeface="Calibri"/>
+                      </a:endParaRPr>
+                    </a:p>
+                  </a:txBody>
+                  <a:tcPr marL="5627" marR="5627" marT="5627" marB="0" anchor="b"/>
+                </a:tc>
+                <a:tc>
+                  <a:txBody>
+                    <a:bodyPr/>
+                    <a:lstStyle/>
+                    <a:p>
+                      <a:pPr algn="l" fontAlgn="b"/>
+                      <a:r>
+                        <a:rPr lang="en-US" sz="600" u="none" strike="noStrike" dirty="0">
+                          <a:effectLst/>
+                        </a:rPr>
+                        <a:t> </a:t>
+                      </a:r>
+                      <a:r>
+                        <a:rPr lang="en-US" sz="600" u="none" strike="noStrike" dirty="0" smtClean="0">
+                          <a:effectLst/>
+                        </a:rPr>
+                        <a:t>Dan</a:t>
+                      </a:r>
+                      <a:endParaRPr lang="en-US" sz="600" b="0" i="0" u="none" strike="noStrike" dirty="0">
+                        <a:solidFill>
+                          <a:srgbClr val="000000"/>
+                        </a:solidFill>
+                        <a:effectLst/>
+                        <a:latin typeface="Calibri"/>
+                      </a:endParaRPr>
+                    </a:p>
+                  </a:txBody>
+                  <a:tcPr marL="5627" marR="5627" marT="5627" marB="0" anchor="b"/>
+                </a:tc>
+                <a:tc>
+                  <a:txBody>
+                    <a:bodyPr/>
+                    <a:lstStyle/>
+                    <a:p>
+                      <a:pPr algn="r" fontAlgn="b"/>
+                      <a:r>
+                        <a:rPr lang="en-US" sz="600" u="none" strike="noStrike">
+                          <a:effectLst/>
+                        </a:rPr>
+                        <a:t>4</a:t>
+                      </a:r>
+                      <a:endParaRPr lang="en-US" sz="600" b="0" i="0" u="none" strike="noStrike">
+                        <a:solidFill>
+                          <a:srgbClr val="000000"/>
+                        </a:solidFill>
+                        <a:effectLst/>
+                        <a:latin typeface="Calibri"/>
+                      </a:endParaRPr>
+                    </a:p>
+                  </a:txBody>
+                  <a:tcPr marL="5627" marR="5627" marT="5627" marB="0" anchor="b"/>
+                </a:tc>
+                <a:tc>
+                  <a:txBody>
+                    <a:bodyPr/>
+                    <a:lstStyle/>
+                    <a:p>
+                      <a:pPr algn="r" fontAlgn="b"/>
+                      <a:r>
+                        <a:rPr lang="en-US" sz="600" u="none" strike="noStrike">
+                          <a:effectLst/>
+                        </a:rPr>
+                        <a:t>4</a:t>
+                      </a:r>
+                      <a:endParaRPr lang="en-US" sz="600" b="0" i="0" u="none" strike="noStrike">
+                        <a:solidFill>
+                          <a:srgbClr val="000000"/>
+                        </a:solidFill>
+                        <a:effectLst/>
+                        <a:latin typeface="Calibri"/>
+                      </a:endParaRPr>
+                    </a:p>
+                  </a:txBody>
+                  <a:tcPr marL="5627" marR="5627" marT="5627" marB="0" anchor="b"/>
+                </a:tc>
+                <a:tc>
+                  <a:txBody>
+                    <a:bodyPr/>
+                    <a:lstStyle/>
+                    <a:p>
+                      <a:pPr algn="r" fontAlgn="b"/>
+                      <a:r>
+                        <a:rPr lang="en-US" sz="600" u="none" strike="noStrike">
+                          <a:effectLst/>
+                        </a:rPr>
+                        <a:t>0</a:t>
+                      </a:r>
+                      <a:endParaRPr lang="en-US" sz="600" b="0" i="0" u="none" strike="noStrike">
+                        <a:solidFill>
+                          <a:srgbClr val="000000"/>
+                        </a:solidFill>
+                        <a:effectLst/>
+                        <a:latin typeface="Calibri"/>
+                      </a:endParaRPr>
+                    </a:p>
+                  </a:txBody>
+                  <a:tcPr marL="5627" marR="5627" marT="5627" marB="0" anchor="b"/>
+                </a:tc>
+                <a:tc>
+                  <a:txBody>
+                    <a:bodyPr/>
+                    <a:lstStyle/>
+                    <a:p>
+                      <a:pPr algn="l" fontAlgn="b"/>
+                      <a:r>
+                        <a:rPr lang="en-US" sz="600" u="none" strike="noStrike">
+                          <a:effectLst/>
+                        </a:rPr>
+                        <a:t>Done</a:t>
+                      </a:r>
+                      <a:endParaRPr lang="en-US" sz="600" b="0" i="0" u="none" strike="noStrike">
+                        <a:solidFill>
+                          <a:srgbClr val="000000"/>
+                        </a:solidFill>
+                        <a:effectLst/>
+                        <a:latin typeface="Calibri"/>
+                      </a:endParaRPr>
+                    </a:p>
+                  </a:txBody>
+                  <a:tcPr marL="5627" marR="5627" marT="5627" marB="0" anchor="b"/>
+                </a:tc>
+                <a:tc>
+                  <a:txBody>
+                    <a:bodyPr/>
+                    <a:lstStyle/>
+                    <a:p>
+                      <a:pPr algn="l" fontAlgn="b"/>
+                      <a:endParaRPr lang="en-US" sz="600" b="0" i="0" u="none" strike="noStrike">
+                        <a:solidFill>
+                          <a:srgbClr val="000000"/>
+                        </a:solidFill>
+                        <a:effectLst/>
+                        <a:latin typeface="Calibri"/>
+                      </a:endParaRPr>
+                    </a:p>
+                  </a:txBody>
+                  <a:tcPr marL="5627" marR="5627" marT="5627" marB="0" anchor="b"/>
+                </a:tc>
+                <a:tc>
+                  <a:txBody>
+                    <a:bodyPr/>
+                    <a:lstStyle/>
+                    <a:p>
+                      <a:pPr algn="l" fontAlgn="b"/>
+                      <a:endParaRPr lang="en-US" sz="600" b="0" i="0" u="none" strike="noStrike">
+                        <a:solidFill>
+                          <a:srgbClr val="000000"/>
+                        </a:solidFill>
+                        <a:effectLst/>
+                        <a:latin typeface="Calibri"/>
+                      </a:endParaRPr>
+                    </a:p>
+                  </a:txBody>
+                  <a:tcPr marL="5627" marR="5627" marT="5627" marB="0" anchor="b"/>
+                </a:tc>
+                <a:tc>
+                  <a:txBody>
+                    <a:bodyPr/>
+                    <a:lstStyle/>
+                    <a:p>
+                      <a:pPr algn="l" fontAlgn="b"/>
+                      <a:endParaRPr lang="en-US" sz="600" b="0" i="0" u="none" strike="noStrike">
+                        <a:solidFill>
+                          <a:srgbClr val="000000"/>
+                        </a:solidFill>
+                        <a:effectLst/>
+                        <a:latin typeface="Calibri"/>
+                      </a:endParaRPr>
+                    </a:p>
+                  </a:txBody>
+                  <a:tcPr marL="5627" marR="5627" marT="5627" marB="0" anchor="b"/>
+                </a:tc>
+              </a:tr>
+              <a:tr h="121463">
+                <a:tc>
+                  <a:txBody>
+                    <a:bodyPr/>
+                    <a:lstStyle/>
+                    <a:p>
+                      <a:pPr algn="l" fontAlgn="b"/>
+                      <a:r>
+                        <a:rPr lang="en-US" sz="600" u="none" strike="noStrike">
+                          <a:effectLst/>
+                        </a:rPr>
+                        <a:t> </a:t>
+                      </a:r>
+                      <a:endParaRPr lang="en-US" sz="600" b="0" i="0" u="none" strike="noStrike">
+                        <a:solidFill>
+                          <a:srgbClr val="000000"/>
+                        </a:solidFill>
+                        <a:effectLst/>
+                        <a:latin typeface="Calibri"/>
+                      </a:endParaRPr>
+                    </a:p>
+                  </a:txBody>
+                  <a:tcPr marL="5627" marR="5627" marT="5627" marB="0" anchor="b"/>
+                </a:tc>
+                <a:tc>
+                  <a:txBody>
+                    <a:bodyPr/>
+                    <a:lstStyle/>
+                    <a:p>
+                      <a:pPr algn="l" fontAlgn="b"/>
+                      <a:r>
+                        <a:rPr lang="en-US" sz="600" u="none" strike="noStrike">
+                          <a:effectLst/>
+                        </a:rPr>
+                        <a:t> </a:t>
+                      </a:r>
+                      <a:endParaRPr lang="en-US" sz="600" b="0" i="0" u="none" strike="noStrike">
+                        <a:solidFill>
+                          <a:srgbClr val="000000"/>
+                        </a:solidFill>
+                        <a:effectLst/>
+                        <a:latin typeface="Calibri"/>
+                      </a:endParaRPr>
+                    </a:p>
+                  </a:txBody>
+                  <a:tcPr marL="5627" marR="5627" marT="5627" marB="0" anchor="b"/>
+                </a:tc>
+                <a:tc>
+                  <a:txBody>
+                    <a:bodyPr/>
+                    <a:lstStyle/>
+                    <a:p>
+                      <a:pPr algn="l" fontAlgn="b"/>
+                      <a:r>
+                        <a:rPr lang="en-US" sz="600" u="none" strike="noStrike">
+                          <a:effectLst/>
+                        </a:rPr>
+                        <a:t>Reports</a:t>
+                      </a:r>
+                      <a:endParaRPr lang="en-US" sz="600" b="0" i="0" u="none" strike="noStrike">
+                        <a:solidFill>
+                          <a:srgbClr val="000000"/>
+                        </a:solidFill>
+                        <a:effectLst/>
+                        <a:latin typeface="Calibri"/>
+                      </a:endParaRPr>
+                    </a:p>
+                  </a:txBody>
+                  <a:tcPr marL="5627" marR="5627" marT="5627" marB="0" anchor="b"/>
+                </a:tc>
+                <a:tc>
+                  <a:txBody>
+                    <a:bodyPr/>
+                    <a:lstStyle/>
+                    <a:p>
+                      <a:pPr algn="l" fontAlgn="b"/>
+                      <a:r>
+                        <a:rPr lang="en-US" sz="600" u="none" strike="noStrike">
+                          <a:effectLst/>
+                        </a:rPr>
+                        <a:t>Design layout</a:t>
+                      </a:r>
+                      <a:endParaRPr lang="en-US" sz="600" b="0" i="0" u="none" strike="noStrike">
+                        <a:solidFill>
+                          <a:srgbClr val="000000"/>
+                        </a:solidFill>
+                        <a:effectLst/>
+                        <a:latin typeface="Calibri"/>
+                      </a:endParaRPr>
+                    </a:p>
+                  </a:txBody>
+                  <a:tcPr marL="5627" marR="5627" marT="5627" marB="0" anchor="b"/>
+                </a:tc>
+                <a:tc>
+                  <a:txBody>
+                    <a:bodyPr/>
+                    <a:lstStyle/>
+                    <a:p>
+                      <a:pPr algn="l" fontAlgn="b"/>
+                      <a:r>
+                        <a:rPr lang="en-US" sz="600" u="none" strike="noStrike" dirty="0">
+                          <a:effectLst/>
+                        </a:rPr>
+                        <a:t> </a:t>
+                      </a:r>
+                      <a:r>
+                        <a:rPr lang="en-US" sz="600" u="none" strike="noStrike" dirty="0" smtClean="0">
+                          <a:effectLst/>
+                        </a:rPr>
+                        <a:t>Gary</a:t>
+                      </a:r>
+                      <a:endParaRPr lang="en-US" sz="600" b="0" i="0" u="none" strike="noStrike" dirty="0">
+                        <a:solidFill>
+                          <a:srgbClr val="000000"/>
+                        </a:solidFill>
+                        <a:effectLst/>
+                        <a:latin typeface="Calibri"/>
+                      </a:endParaRPr>
+                    </a:p>
+                  </a:txBody>
+                  <a:tcPr marL="5627" marR="5627" marT="5627" marB="0" anchor="b"/>
+                </a:tc>
+                <a:tc>
+                  <a:txBody>
+                    <a:bodyPr/>
+                    <a:lstStyle/>
+                    <a:p>
+                      <a:pPr algn="r" fontAlgn="b"/>
+                      <a:r>
+                        <a:rPr lang="en-US" sz="600" u="none" strike="noStrike">
+                          <a:effectLst/>
+                        </a:rPr>
+                        <a:t>2</a:t>
+                      </a:r>
+                      <a:endParaRPr lang="en-US" sz="600" b="0" i="0" u="none" strike="noStrike">
+                        <a:solidFill>
+                          <a:srgbClr val="000000"/>
+                        </a:solidFill>
+                        <a:effectLst/>
+                        <a:latin typeface="Calibri"/>
+                      </a:endParaRPr>
+                    </a:p>
+                  </a:txBody>
+                  <a:tcPr marL="5627" marR="5627" marT="5627" marB="0" anchor="b"/>
+                </a:tc>
+                <a:tc>
+                  <a:txBody>
+                    <a:bodyPr/>
+                    <a:lstStyle/>
+                    <a:p>
+                      <a:pPr algn="r" fontAlgn="b"/>
+                      <a:r>
+                        <a:rPr lang="en-US" sz="600" u="none" strike="noStrike">
+                          <a:effectLst/>
+                        </a:rPr>
+                        <a:t>2</a:t>
+                      </a:r>
+                      <a:endParaRPr lang="en-US" sz="600" b="0" i="0" u="none" strike="noStrike">
+                        <a:solidFill>
+                          <a:srgbClr val="000000"/>
+                        </a:solidFill>
+                        <a:effectLst/>
+                        <a:latin typeface="Calibri"/>
+                      </a:endParaRPr>
+                    </a:p>
+                  </a:txBody>
+                  <a:tcPr marL="5627" marR="5627" marT="5627" marB="0" anchor="b"/>
+                </a:tc>
+                <a:tc>
+                  <a:txBody>
+                    <a:bodyPr/>
+                    <a:lstStyle/>
+                    <a:p>
+                      <a:pPr algn="r" fontAlgn="b"/>
+                      <a:r>
+                        <a:rPr lang="en-US" sz="600" u="none" strike="noStrike">
+                          <a:effectLst/>
+                        </a:rPr>
+                        <a:t>0</a:t>
+                      </a:r>
+                      <a:endParaRPr lang="en-US" sz="600" b="0" i="0" u="none" strike="noStrike">
+                        <a:solidFill>
+                          <a:srgbClr val="000000"/>
+                        </a:solidFill>
+                        <a:effectLst/>
+                        <a:latin typeface="Calibri"/>
+                      </a:endParaRPr>
+                    </a:p>
+                  </a:txBody>
+                  <a:tcPr marL="5627" marR="5627" marT="5627" marB="0" anchor="b"/>
+                </a:tc>
+                <a:tc>
+                  <a:txBody>
+                    <a:bodyPr/>
+                    <a:lstStyle/>
+                    <a:p>
+                      <a:pPr algn="l" fontAlgn="b"/>
+                      <a:r>
+                        <a:rPr lang="en-US" sz="600" u="none" strike="noStrike">
+                          <a:effectLst/>
+                        </a:rPr>
+                        <a:t>Done</a:t>
+                      </a:r>
+                      <a:endParaRPr lang="en-US" sz="600" b="0" i="0" u="none" strike="noStrike">
+                        <a:solidFill>
+                          <a:srgbClr val="000000"/>
+                        </a:solidFill>
+                        <a:effectLst/>
+                        <a:latin typeface="Calibri"/>
+                      </a:endParaRPr>
+                    </a:p>
+                  </a:txBody>
+                  <a:tcPr marL="5627" marR="5627" marT="5627" marB="0" anchor="b"/>
+                </a:tc>
+                <a:tc gridSpan="3">
+                  <a:txBody>
+                    <a:bodyPr/>
+                    <a:lstStyle/>
+                    <a:p>
+                      <a:pPr algn="ctr" fontAlgn="b"/>
+                      <a:r>
+                        <a:rPr lang="en-US" sz="600" u="none" strike="noStrike">
+                          <a:effectLst/>
+                        </a:rPr>
+                        <a:t>Iteration 3</a:t>
+                      </a:r>
+                      <a:endParaRPr lang="en-US" sz="600" b="0" i="0" u="none" strike="noStrike">
+                        <a:solidFill>
+                          <a:srgbClr val="000000"/>
+                        </a:solidFill>
+                        <a:effectLst/>
+                        <a:latin typeface="Calibri"/>
+                      </a:endParaRPr>
+                    </a:p>
+                  </a:txBody>
+                  <a:tcPr marL="5627" marR="5627" marT="5627" marB="0" anchor="b"/>
+                </a:tc>
+                <a:tc hMerge="1">
+                  <a:txBody>
+                    <a:bodyPr/>
+                    <a:lstStyle/>
+                    <a:p>
+                      <a:endParaRPr lang="en-US"/>
+                    </a:p>
+                  </a:txBody>
+                  <a:tcPr/>
+                </a:tc>
+                <a:tc hMerge="1">
+                  <a:txBody>
+                    <a:bodyPr/>
+                    <a:lstStyle/>
+                    <a:p>
+                      <a:endParaRPr lang="en-US"/>
+                    </a:p>
+                  </a:txBody>
+                  <a:tcPr/>
+                </a:tc>
+              </a:tr>
+              <a:tr h="219847">
+                <a:tc>
+                  <a:txBody>
+                    <a:bodyPr/>
+                    <a:lstStyle/>
+                    <a:p>
+                      <a:pPr algn="l" fontAlgn="b"/>
+                      <a:r>
+                        <a:rPr lang="en-US" sz="600" u="none" strike="noStrike">
+                          <a:effectLst/>
+                        </a:rPr>
+                        <a:t> </a:t>
+                      </a:r>
+                      <a:endParaRPr lang="en-US" sz="600" b="0" i="0" u="none" strike="noStrike">
+                        <a:solidFill>
+                          <a:srgbClr val="000000"/>
+                        </a:solidFill>
+                        <a:effectLst/>
+                        <a:latin typeface="Calibri"/>
+                      </a:endParaRPr>
+                    </a:p>
+                  </a:txBody>
+                  <a:tcPr marL="5627" marR="5627" marT="5627" marB="0" anchor="b"/>
+                </a:tc>
+                <a:tc>
+                  <a:txBody>
+                    <a:bodyPr/>
+                    <a:lstStyle/>
+                    <a:p>
+                      <a:pPr algn="l" fontAlgn="b"/>
+                      <a:r>
+                        <a:rPr lang="en-US" sz="600" u="none" strike="noStrike">
+                          <a:effectLst/>
+                        </a:rPr>
+                        <a:t> </a:t>
+                      </a:r>
+                      <a:endParaRPr lang="en-US" sz="600" b="0" i="0" u="none" strike="noStrike">
+                        <a:solidFill>
+                          <a:srgbClr val="000000"/>
+                        </a:solidFill>
+                        <a:effectLst/>
+                        <a:latin typeface="Calibri"/>
+                      </a:endParaRPr>
+                    </a:p>
+                  </a:txBody>
+                  <a:tcPr marL="5627" marR="5627" marT="5627" marB="0" anchor="b"/>
+                </a:tc>
+                <a:tc>
+                  <a:txBody>
+                    <a:bodyPr/>
+                    <a:lstStyle/>
+                    <a:p>
+                      <a:pPr algn="l" fontAlgn="b"/>
+                      <a:r>
+                        <a:rPr lang="en-US" sz="600" u="none" strike="noStrike">
+                          <a:effectLst/>
+                        </a:rPr>
+                        <a:t> </a:t>
+                      </a:r>
+                      <a:endParaRPr lang="en-US" sz="600" b="0" i="0" u="none" strike="noStrike">
+                        <a:solidFill>
+                          <a:srgbClr val="000000"/>
+                        </a:solidFill>
+                        <a:effectLst/>
+                        <a:latin typeface="Calibri"/>
+                      </a:endParaRPr>
+                    </a:p>
+                  </a:txBody>
+                  <a:tcPr marL="5627" marR="5627" marT="5627" marB="0" anchor="b"/>
+                </a:tc>
+                <a:tc>
+                  <a:txBody>
+                    <a:bodyPr/>
+                    <a:lstStyle/>
+                    <a:p>
+                      <a:pPr algn="l" fontAlgn="b"/>
+                      <a:r>
+                        <a:rPr lang="en-US" sz="600" u="none" strike="noStrike">
+                          <a:effectLst/>
+                        </a:rPr>
+                        <a:t>Implement SQL</a:t>
+                      </a:r>
+                      <a:endParaRPr lang="en-US" sz="600" b="0" i="0" u="none" strike="noStrike">
+                        <a:solidFill>
+                          <a:srgbClr val="000000"/>
+                        </a:solidFill>
+                        <a:effectLst/>
+                        <a:latin typeface="Calibri"/>
+                      </a:endParaRPr>
+                    </a:p>
+                  </a:txBody>
+                  <a:tcPr marL="5627" marR="5627" marT="5627" marB="0" anchor="b"/>
+                </a:tc>
+                <a:tc>
+                  <a:txBody>
+                    <a:bodyPr/>
+                    <a:lstStyle/>
+                    <a:p>
+                      <a:pPr algn="l" fontAlgn="b"/>
+                      <a:r>
+                        <a:rPr lang="en-US" sz="600" u="none" strike="noStrike" dirty="0">
+                          <a:effectLst/>
+                        </a:rPr>
+                        <a:t> </a:t>
+                      </a:r>
+                      <a:r>
+                        <a:rPr lang="en-US" sz="600" u="none" strike="noStrike" dirty="0" smtClean="0">
+                          <a:effectLst/>
+                        </a:rPr>
+                        <a:t>Dan</a:t>
+                      </a:r>
+                      <a:endParaRPr lang="en-US" sz="600" b="0" i="0" u="none" strike="noStrike" dirty="0">
+                        <a:solidFill>
+                          <a:srgbClr val="000000"/>
+                        </a:solidFill>
+                        <a:effectLst/>
+                        <a:latin typeface="Calibri"/>
+                      </a:endParaRPr>
+                    </a:p>
+                  </a:txBody>
+                  <a:tcPr marL="5627" marR="5627" marT="5627" marB="0" anchor="b"/>
+                </a:tc>
+                <a:tc>
+                  <a:txBody>
+                    <a:bodyPr/>
+                    <a:lstStyle/>
+                    <a:p>
+                      <a:pPr algn="r" fontAlgn="b"/>
+                      <a:r>
+                        <a:rPr lang="en-US" sz="600" u="none" strike="noStrike">
+                          <a:effectLst/>
+                        </a:rPr>
+                        <a:t>15</a:t>
+                      </a:r>
+                      <a:endParaRPr lang="en-US" sz="600" b="0" i="0" u="none" strike="noStrike">
+                        <a:solidFill>
+                          <a:srgbClr val="000000"/>
+                        </a:solidFill>
+                        <a:effectLst/>
+                        <a:latin typeface="Calibri"/>
+                      </a:endParaRPr>
+                    </a:p>
+                  </a:txBody>
+                  <a:tcPr marL="5627" marR="5627" marT="5627" marB="0" anchor="b"/>
+                </a:tc>
+                <a:tc>
+                  <a:txBody>
+                    <a:bodyPr/>
+                    <a:lstStyle/>
+                    <a:p>
+                      <a:pPr algn="r" fontAlgn="b"/>
+                      <a:r>
+                        <a:rPr lang="en-US" sz="600" u="none" strike="noStrike">
+                          <a:effectLst/>
+                        </a:rPr>
+                        <a:t>12</a:t>
+                      </a:r>
+                      <a:endParaRPr lang="en-US" sz="600" b="0" i="0" u="none" strike="noStrike">
+                        <a:solidFill>
+                          <a:srgbClr val="000000"/>
+                        </a:solidFill>
+                        <a:effectLst/>
+                        <a:latin typeface="Calibri"/>
+                      </a:endParaRPr>
+                    </a:p>
+                  </a:txBody>
+                  <a:tcPr marL="5627" marR="5627" marT="5627" marB="0" anchor="b"/>
+                </a:tc>
+                <a:tc>
+                  <a:txBody>
+                    <a:bodyPr/>
+                    <a:lstStyle/>
+                    <a:p>
+                      <a:pPr algn="r" fontAlgn="b"/>
+                      <a:r>
+                        <a:rPr lang="en-US" sz="600" u="none" strike="noStrike">
+                          <a:effectLst/>
+                        </a:rPr>
+                        <a:t>0</a:t>
+                      </a:r>
+                      <a:endParaRPr lang="en-US" sz="600" b="0" i="0" u="none" strike="noStrike">
+                        <a:solidFill>
+                          <a:srgbClr val="000000"/>
+                        </a:solidFill>
+                        <a:effectLst/>
+                        <a:latin typeface="Calibri"/>
+                      </a:endParaRPr>
+                    </a:p>
+                  </a:txBody>
+                  <a:tcPr marL="5627" marR="5627" marT="5627" marB="0" anchor="b"/>
+                </a:tc>
+                <a:tc>
+                  <a:txBody>
+                    <a:bodyPr/>
+                    <a:lstStyle/>
+                    <a:p>
+                      <a:pPr algn="l" fontAlgn="b"/>
+                      <a:r>
+                        <a:rPr lang="en-US" sz="600" u="none" strike="noStrike">
+                          <a:effectLst/>
+                        </a:rPr>
+                        <a:t>Done</a:t>
+                      </a:r>
                       <a:endParaRPr lang="en-US" sz="600" b="0" i="0" u="none" strike="noStrike">
                         <a:solidFill>
                           <a:srgbClr val="000000"/>
@@ -12538,7 +14416,7 @@
                   <a:tcPr marL="5627" marR="5627" marT="5627" marB="0" anchor="b"/>
                 </a:tc>
               </a:tr>
-              <a:tr h="119677">
+              <a:tr h="121463">
                 <a:tc>
                   <a:txBody>
                     <a:bodyPr/>
@@ -12553,7 +14431,7 @@
                       </a:r>
                       <a:endParaRPr lang="en-US" sz="600" b="0" i="0" u="none" strike="noStrike">
                         <a:solidFill>
-                          <a:srgbClr val="9C6500"/>
+                          <a:srgbClr val="000000"/>
                         </a:solidFill>
                         <a:effectLst/>
                         <a:latin typeface="Calibri"/>
@@ -12576,99 +14454,7 @@
                       </a:r>
                       <a:endParaRPr lang="en-US" sz="600" b="0" i="0" u="none" strike="noStrike">
                         <a:solidFill>
-                          <a:srgbClr val="9C6500"/>
-                        </a:solidFill>
-                        <a:effectLst/>
-                        <a:latin typeface="Calibri"/>
-                      </a:endParaRPr>
-                    </a:p>
-                  </a:txBody>
-                  <a:tcPr marL="5627" marR="5627" marT="5627" marB="0" anchor="b"/>
-                </a:tc>
-                <a:tc>
-                  <a:txBody>
-                    <a:bodyPr/>
-                    <a:lstStyle/>
-                    <a:p>
-                      <a:pPr algn="l" fontAlgn="b"/>
-                      <a:r>
-                        <a:rPr lang="en-US" sz="600" u="none" strike="noStrike">
-                          <a:effectLst/>
-                        </a:rPr>
-                        <a:t>Work Management</a:t>
-                      </a:r>
-                      <a:endParaRPr lang="en-US" sz="600" b="0" i="0" u="none" strike="noStrike">
-                        <a:solidFill>
-                          <a:srgbClr val="9C6500"/>
-                        </a:solidFill>
-                        <a:effectLst/>
-                        <a:latin typeface="Calibri"/>
-                      </a:endParaRPr>
-                    </a:p>
-                  </a:txBody>
-                  <a:tcPr marL="5627" marR="5627" marT="5627" marB="0" anchor="b"/>
-                </a:tc>
-                <a:tc>
-                  <a:txBody>
-                    <a:bodyPr/>
-                    <a:lstStyle/>
-                    <a:p>
-                      <a:pPr algn="l" fontAlgn="b"/>
-                      <a:r>
-                        <a:rPr lang="en-US" sz="600" u="none" strike="noStrike">
-                          <a:effectLst/>
-                        </a:rPr>
-                        <a:t>Implementation</a:t>
-                      </a:r>
-                      <a:endParaRPr lang="en-US" sz="600" b="0" i="0" u="none" strike="noStrike">
-                        <a:solidFill>
-                          <a:srgbClr val="9C6500"/>
-                        </a:solidFill>
-                        <a:effectLst/>
-                        <a:latin typeface="Calibri"/>
-                      </a:endParaRPr>
-                    </a:p>
-                  </a:txBody>
-                  <a:tcPr marL="5627" marR="5627" marT="5627" marB="0" anchor="b"/>
-                </a:tc>
-                <a:tc>
-                  <a:txBody>
-                    <a:bodyPr/>
-                    <a:lstStyle/>
-                    <a:p>
-                      <a:pPr algn="l" fontAlgn="b"/>
-                      <a:r>
-                        <a:rPr lang="en-US" sz="600" u="none" strike="noStrike">
-                          <a:effectLst/>
-                        </a:rPr>
-                        <a:t>Jose</a:t>
-                      </a:r>
-                      <a:endParaRPr lang="en-US" sz="600" b="0" i="0" u="none" strike="noStrike">
-                        <a:solidFill>
-                          <a:srgbClr val="9C6500"/>
-                        </a:solidFill>
-                        <a:effectLst/>
-                        <a:latin typeface="Calibri"/>
-                      </a:endParaRPr>
-                    </a:p>
-                  </a:txBody>
-                  <a:tcPr marL="5627" marR="5627" marT="5627" marB="0" anchor="b"/>
-                </a:tc>
-                <a:tc>
-                  <a:txBody>
-                    <a:bodyPr/>
-                    <a:lstStyle/>
-                    <a:p>
-                      <a:pPr algn="r" fontAlgn="b"/>
-                      <a:r>
-                        <a:rPr lang="en-US" sz="600" u="none" strike="noStrike">
-                          <a:effectLst/>
-                        </a:rPr>
-                        <a:t>2</a:t>
-                      </a:r>
-                      <a:endParaRPr lang="en-US" sz="600" b="0" i="0" u="none" strike="noStrike">
-                        <a:solidFill>
-                          <a:srgbClr val="9C6500"/>
+                          <a:srgbClr val="000000"/>
                         </a:solidFill>
                         <a:effectLst/>
                         <a:latin typeface="Calibri"/>
@@ -12691,112 +14477,216 @@
                       </a:r>
                       <a:endParaRPr lang="en-US" sz="600" b="0" i="0" u="none" strike="noStrike">
                         <a:solidFill>
-                          <a:srgbClr val="9C6500"/>
-                        </a:solidFill>
-                        <a:effectLst/>
-                        <a:latin typeface="Calibri"/>
-                      </a:endParaRPr>
-                    </a:p>
-                  </a:txBody>
-                  <a:tcPr marL="5627" marR="5627" marT="5627" marB="0" anchor="b"/>
-                </a:tc>
-                <a:tc>
-                  <a:txBody>
-                    <a:bodyPr/>
-                    <a:lstStyle/>
-                    <a:p>
-                      <a:pPr algn="r" fontAlgn="b"/>
-                      <a:r>
-                        <a:rPr lang="en-US" sz="600" u="none" strike="noStrike">
-                          <a:effectLst/>
-                        </a:rPr>
-                        <a:t>2</a:t>
-                      </a:r>
-                      <a:endParaRPr lang="en-US" sz="600" b="0" i="0" u="none" strike="noStrike">
-                        <a:solidFill>
-                          <a:srgbClr val="9C6500"/>
-                        </a:solidFill>
-                        <a:effectLst/>
-                        <a:latin typeface="Calibri"/>
-                      </a:endParaRPr>
-                    </a:p>
-                  </a:txBody>
-                  <a:tcPr marL="5627" marR="5627" marT="5627" marB="0" anchor="b"/>
-                </a:tc>
-                <a:tc>
-                  <a:txBody>
-                    <a:bodyPr/>
-                    <a:lstStyle/>
-                    <a:p>
-                      <a:pPr algn="l" fontAlgn="b"/>
-                      <a:endParaRPr lang="en-US" sz="600" b="0" i="0" u="none" strike="noStrike">
-                        <a:solidFill>
-                          <a:srgbClr val="000000"/>
-                        </a:solidFill>
-                        <a:effectLst/>
-                        <a:latin typeface="Calibri"/>
-                      </a:endParaRPr>
-                    </a:p>
-                  </a:txBody>
-                  <a:tcPr marL="5627" marR="5627" marT="5627" marB="0" anchor="b"/>
-                </a:tc>
-                <a:tc>
-                  <a:txBody>
-                    <a:bodyPr/>
-                    <a:lstStyle/>
-                    <a:p>
-                      <a:pPr algn="r" fontAlgn="b"/>
-                      <a:r>
-                        <a:rPr lang="en-US" sz="600" u="none" strike="noStrike">
-                          <a:effectLst/>
-                        </a:rPr>
-                        <a:t>22</a:t>
-                      </a:r>
-                      <a:endParaRPr lang="en-US" sz="600" b="0" i="0" u="none" strike="noStrike">
-                        <a:solidFill>
-                          <a:srgbClr val="000000"/>
-                        </a:solidFill>
-                        <a:effectLst/>
-                        <a:latin typeface="Calibri"/>
-                      </a:endParaRPr>
-                    </a:p>
-                  </a:txBody>
-                  <a:tcPr marL="5627" marR="5627" marT="5627" marB="0" anchor="b"/>
-                </a:tc>
-                <a:tc>
-                  <a:txBody>
-                    <a:bodyPr/>
-                    <a:lstStyle/>
-                    <a:p>
-                      <a:pPr algn="r" fontAlgn="b"/>
-                      <a:r>
-                        <a:rPr lang="en-US" sz="600" u="none" strike="noStrike">
-                          <a:effectLst/>
-                        </a:rPr>
-                        <a:t>20</a:t>
-                      </a:r>
-                      <a:endParaRPr lang="en-US" sz="600" b="0" i="0" u="none" strike="noStrike">
-                        <a:solidFill>
-                          <a:srgbClr val="000000"/>
-                        </a:solidFill>
-                        <a:effectLst/>
-                        <a:latin typeface="Calibri"/>
-                      </a:endParaRPr>
-                    </a:p>
-                  </a:txBody>
-                  <a:tcPr marL="5627" marR="5627" marT="5627" marB="0" anchor="b"/>
-                </a:tc>
-                <a:tc>
-                  <a:txBody>
-                    <a:bodyPr/>
-                    <a:lstStyle/>
-                    <a:p>
-                      <a:pPr algn="r" fontAlgn="b"/>
-                      <a:r>
-                        <a:rPr lang="en-US" sz="600" u="none" strike="noStrike">
-                          <a:effectLst/>
-                        </a:rPr>
-                        <a:t>5</a:t>
+                          <a:srgbClr val="000000"/>
+                        </a:solidFill>
+                        <a:effectLst/>
+                        <a:latin typeface="Calibri"/>
+                      </a:endParaRPr>
+                    </a:p>
+                  </a:txBody>
+                  <a:tcPr marL="5627" marR="5627" marT="5627" marB="0" anchor="b"/>
+                </a:tc>
+                <a:tc>
+                  <a:txBody>
+                    <a:bodyPr/>
+                    <a:lstStyle/>
+                    <a:p>
+                      <a:pPr algn="l" fontAlgn="b"/>
+                      <a:r>
+                        <a:rPr lang="en-US" sz="600" u="none" strike="noStrike">
+                          <a:effectLst/>
+                        </a:rPr>
+                        <a:t>Build Visualization</a:t>
+                      </a:r>
+                      <a:endParaRPr lang="en-US" sz="600" b="0" i="0" u="none" strike="noStrike">
+                        <a:solidFill>
+                          <a:srgbClr val="000000"/>
+                        </a:solidFill>
+                        <a:effectLst/>
+                        <a:latin typeface="Calibri"/>
+                      </a:endParaRPr>
+                    </a:p>
+                  </a:txBody>
+                  <a:tcPr marL="5627" marR="5627" marT="5627" marB="0" anchor="b"/>
+                </a:tc>
+                <a:tc>
+                  <a:txBody>
+                    <a:bodyPr/>
+                    <a:lstStyle/>
+                    <a:p>
+                      <a:pPr algn="l" fontAlgn="b"/>
+                      <a:r>
+                        <a:rPr lang="en-US" sz="600" u="none" strike="noStrike" dirty="0">
+                          <a:effectLst/>
+                        </a:rPr>
+                        <a:t> </a:t>
+                      </a:r>
+                      <a:r>
+                        <a:rPr lang="en-US" sz="600" u="none" strike="noStrike" dirty="0" smtClean="0">
+                          <a:effectLst/>
+                        </a:rPr>
+                        <a:t>Dan</a:t>
+                      </a:r>
+                      <a:endParaRPr lang="en-US" sz="600" b="0" i="0" u="none" strike="noStrike" dirty="0">
+                        <a:solidFill>
+                          <a:srgbClr val="000000"/>
+                        </a:solidFill>
+                        <a:effectLst/>
+                        <a:latin typeface="Calibri"/>
+                      </a:endParaRPr>
+                    </a:p>
+                  </a:txBody>
+                  <a:tcPr marL="5627" marR="5627" marT="5627" marB="0" anchor="b"/>
+                </a:tc>
+                <a:tc>
+                  <a:txBody>
+                    <a:bodyPr/>
+                    <a:lstStyle/>
+                    <a:p>
+                      <a:pPr algn="r" fontAlgn="b"/>
+                      <a:r>
+                        <a:rPr lang="en-US" sz="600" u="none" strike="noStrike">
+                          <a:effectLst/>
+                        </a:rPr>
+                        <a:t>15</a:t>
+                      </a:r>
+                      <a:endParaRPr lang="en-US" sz="600" b="0" i="0" u="none" strike="noStrike">
+                        <a:solidFill>
+                          <a:srgbClr val="000000"/>
+                        </a:solidFill>
+                        <a:effectLst/>
+                        <a:latin typeface="Calibri"/>
+                      </a:endParaRPr>
+                    </a:p>
+                  </a:txBody>
+                  <a:tcPr marL="5627" marR="5627" marT="5627" marB="0" anchor="b"/>
+                </a:tc>
+                <a:tc>
+                  <a:txBody>
+                    <a:bodyPr/>
+                    <a:lstStyle/>
+                    <a:p>
+                      <a:pPr algn="r" fontAlgn="b"/>
+                      <a:r>
+                        <a:rPr lang="en-US" sz="600" u="none" strike="noStrike">
+                          <a:effectLst/>
+                        </a:rPr>
+                        <a:t>12</a:t>
+                      </a:r>
+                      <a:endParaRPr lang="en-US" sz="600" b="0" i="0" u="none" strike="noStrike">
+                        <a:solidFill>
+                          <a:srgbClr val="000000"/>
+                        </a:solidFill>
+                        <a:effectLst/>
+                        <a:latin typeface="Calibri"/>
+                      </a:endParaRPr>
+                    </a:p>
+                  </a:txBody>
+                  <a:tcPr marL="5627" marR="5627" marT="5627" marB="0" anchor="b"/>
+                </a:tc>
+                <a:tc>
+                  <a:txBody>
+                    <a:bodyPr/>
+                    <a:lstStyle/>
+                    <a:p>
+                      <a:pPr algn="r" fontAlgn="b"/>
+                      <a:r>
+                        <a:rPr lang="en-US" sz="600" u="none" strike="noStrike">
+                          <a:effectLst/>
+                        </a:rPr>
+                        <a:t>0</a:t>
+                      </a:r>
+                      <a:endParaRPr lang="en-US" sz="600" b="0" i="0" u="none" strike="noStrike">
+                        <a:solidFill>
+                          <a:srgbClr val="000000"/>
+                        </a:solidFill>
+                        <a:effectLst/>
+                        <a:latin typeface="Calibri"/>
+                      </a:endParaRPr>
+                    </a:p>
+                  </a:txBody>
+                  <a:tcPr marL="5627" marR="5627" marT="5627" marB="0" anchor="b"/>
+                </a:tc>
+                <a:tc>
+                  <a:txBody>
+                    <a:bodyPr/>
+                    <a:lstStyle/>
+                    <a:p>
+                      <a:pPr algn="l" fontAlgn="b"/>
+                      <a:r>
+                        <a:rPr lang="en-US" sz="600" u="none" strike="noStrike">
+                          <a:effectLst/>
+                        </a:rPr>
+                        <a:t>Done</a:t>
+                      </a:r>
+                      <a:endParaRPr lang="en-US" sz="600" b="0" i="0" u="none" strike="noStrike">
+                        <a:solidFill>
+                          <a:srgbClr val="000000"/>
+                        </a:solidFill>
+                        <a:effectLst/>
+                        <a:latin typeface="Calibri"/>
+                      </a:endParaRPr>
+                    </a:p>
+                  </a:txBody>
+                  <a:tcPr marL="5627" marR="5627" marT="5627" marB="0" anchor="b"/>
+                </a:tc>
+                <a:tc>
+                  <a:txBody>
+                    <a:bodyPr/>
+                    <a:lstStyle/>
+                    <a:p>
+                      <a:pPr algn="r" fontAlgn="b"/>
+                      <a:r>
+                        <a:rPr lang="en-US" sz="600" u="none" strike="noStrike">
+                          <a:effectLst/>
+                        </a:rPr>
+                        <a:t>49</a:t>
+                      </a:r>
+                      <a:endParaRPr lang="en-US" sz="600" b="0" i="0" u="none" strike="noStrike">
+                        <a:solidFill>
+                          <a:srgbClr val="000000"/>
+                        </a:solidFill>
+                        <a:effectLst/>
+                        <a:latin typeface="Calibri"/>
+                      </a:endParaRPr>
+                    </a:p>
+                  </a:txBody>
+                  <a:tcPr marL="5627" marR="5627" marT="5627" marB="0" anchor="b"/>
+                </a:tc>
+                <a:tc>
+                  <a:txBody>
+                    <a:bodyPr/>
+                    <a:lstStyle/>
+                    <a:p>
+                      <a:pPr algn="r" fontAlgn="b"/>
+                      <a:r>
+                        <a:rPr lang="en-US" sz="600" u="none" strike="noStrike">
+                          <a:effectLst/>
+                        </a:rPr>
+                        <a:t>43</a:t>
+                      </a:r>
+                      <a:endParaRPr lang="en-US" sz="600" b="0" i="0" u="none" strike="noStrike">
+                        <a:solidFill>
+                          <a:srgbClr val="000000"/>
+                        </a:solidFill>
+                        <a:effectLst/>
+                        <a:latin typeface="Calibri"/>
+                      </a:endParaRPr>
+                    </a:p>
+                  </a:txBody>
+                  <a:tcPr marL="5627" marR="5627" marT="5627" marB="0" anchor="b"/>
+                </a:tc>
+                <a:tc>
+                  <a:txBody>
+                    <a:bodyPr/>
+                    <a:lstStyle/>
+                    <a:p>
+                      <a:pPr algn="r" fontAlgn="b"/>
+                      <a:r>
+                        <a:rPr lang="en-US" sz="600" u="none" strike="noStrike">
+                          <a:effectLst/>
+                        </a:rPr>
+                        <a:t>0</a:t>
                       </a:r>
                       <a:endParaRPr lang="en-US" sz="600" b="0" i="0" u="none" strike="noStrike">
                         <a:solidFill>
@@ -12810,1753 +14700,132 @@
                   <a:tcPr marL="5627" marR="5627" marT="5627" marB="0" anchor="b"/>
                 </a:tc>
               </a:tr>
-              <a:tr h="119677">
-                <a:tc>
-                  <a:txBody>
-                    <a:bodyPr/>
-                    <a:lstStyle/>
-                    <a:p>
-                      <a:pPr algn="r" fontAlgn="b"/>
-                      <a:r>
-                        <a:rPr lang="en-US" sz="600" u="none" strike="noStrike">
-                          <a:effectLst/>
-                        </a:rPr>
-                        <a:t>18-Nov</a:t>
-                      </a:r>
-                      <a:endParaRPr lang="en-US" sz="600" b="0" i="0" u="none" strike="noStrike">
-                        <a:solidFill>
-                          <a:srgbClr val="000000"/>
-                        </a:solidFill>
-                        <a:effectLst/>
-                        <a:latin typeface="Calibri"/>
-                      </a:endParaRPr>
-                    </a:p>
-                  </a:txBody>
-                  <a:tcPr marL="5627" marR="5627" marT="5627" marB="0" anchor="b"/>
-                </a:tc>
-                <a:tc>
-                  <a:txBody>
-                    <a:bodyPr/>
-                    <a:lstStyle/>
-                    <a:p>
-                      <a:pPr algn="r" fontAlgn="b"/>
-                      <a:r>
-                        <a:rPr lang="en-US" sz="600" u="none" strike="noStrike">
-                          <a:effectLst/>
-                        </a:rPr>
-                        <a:t>3</a:t>
-                      </a:r>
-                      <a:endParaRPr lang="en-US" sz="600" b="0" i="0" u="none" strike="noStrike">
-                        <a:solidFill>
-                          <a:srgbClr val="000000"/>
-                        </a:solidFill>
-                        <a:effectLst/>
-                        <a:latin typeface="Calibri"/>
-                      </a:endParaRPr>
-                    </a:p>
-                  </a:txBody>
-                  <a:tcPr marL="5627" marR="5627" marT="5627" marB="0" anchor="b"/>
-                </a:tc>
-                <a:tc>
-                  <a:txBody>
-                    <a:bodyPr/>
-                    <a:lstStyle/>
-                    <a:p>
-                      <a:pPr algn="l" fontAlgn="b"/>
-                      <a:r>
-                        <a:rPr lang="en-US" sz="600" u="none" strike="noStrike">
-                          <a:effectLst/>
-                        </a:rPr>
-                        <a:t>Review Feedback</a:t>
-                      </a:r>
-                      <a:endParaRPr lang="en-US" sz="600" b="0" i="0" u="none" strike="noStrike">
-                        <a:solidFill>
-                          <a:srgbClr val="000000"/>
-                        </a:solidFill>
-                        <a:effectLst/>
-                        <a:latin typeface="Calibri"/>
-                      </a:endParaRPr>
-                    </a:p>
-                  </a:txBody>
-                  <a:tcPr marL="5627" marR="5627" marT="5627" marB="0" anchor="b"/>
-                </a:tc>
-                <a:tc>
-                  <a:txBody>
-                    <a:bodyPr/>
-                    <a:lstStyle/>
-                    <a:p>
-                      <a:pPr algn="l" fontAlgn="b"/>
-                      <a:r>
-                        <a:rPr lang="en-US" sz="600" u="none" strike="noStrike">
-                          <a:effectLst/>
-                        </a:rPr>
-                        <a:t> </a:t>
-                      </a:r>
-                      <a:endParaRPr lang="en-US" sz="600" b="0" i="0" u="none" strike="noStrike">
-                        <a:solidFill>
-                          <a:srgbClr val="000000"/>
-                        </a:solidFill>
-                        <a:effectLst/>
-                        <a:latin typeface="Calibri"/>
-                      </a:endParaRPr>
-                    </a:p>
-                  </a:txBody>
-                  <a:tcPr marL="5627" marR="5627" marT="5627" marB="0" anchor="b"/>
-                </a:tc>
-                <a:tc>
-                  <a:txBody>
-                    <a:bodyPr/>
-                    <a:lstStyle/>
-                    <a:p>
-                      <a:pPr algn="l" fontAlgn="b"/>
-                      <a:r>
-                        <a:rPr lang="en-US" sz="600" u="none" strike="noStrike">
-                          <a:effectLst/>
-                        </a:rPr>
-                        <a:t>Team</a:t>
-                      </a:r>
-                      <a:endParaRPr lang="en-US" sz="600" b="0" i="0" u="none" strike="noStrike">
-                        <a:solidFill>
-                          <a:srgbClr val="000000"/>
-                        </a:solidFill>
-                        <a:effectLst/>
-                        <a:latin typeface="Calibri"/>
-                      </a:endParaRPr>
-                    </a:p>
-                  </a:txBody>
-                  <a:tcPr marL="5627" marR="5627" marT="5627" marB="0" anchor="b"/>
-                </a:tc>
-                <a:tc>
-                  <a:txBody>
-                    <a:bodyPr/>
-                    <a:lstStyle/>
-                    <a:p>
-                      <a:pPr algn="r" fontAlgn="b"/>
-                      <a:r>
-                        <a:rPr lang="en-US" sz="600" u="none" strike="noStrike">
-                          <a:effectLst/>
-                        </a:rPr>
-                        <a:t>2</a:t>
-                      </a:r>
-                      <a:endParaRPr lang="en-US" sz="600" b="0" i="0" u="none" strike="noStrike">
-                        <a:solidFill>
-                          <a:srgbClr val="000000"/>
-                        </a:solidFill>
-                        <a:effectLst/>
-                        <a:latin typeface="Calibri"/>
-                      </a:endParaRPr>
-                    </a:p>
-                  </a:txBody>
-                  <a:tcPr marL="5627" marR="5627" marT="5627" marB="0" anchor="b"/>
-                </a:tc>
-                <a:tc>
-                  <a:txBody>
-                    <a:bodyPr/>
-                    <a:lstStyle/>
-                    <a:p>
-                      <a:pPr algn="l" fontAlgn="b"/>
-                      <a:r>
-                        <a:rPr lang="en-US" sz="600" u="none" strike="noStrike">
-                          <a:effectLst/>
-                        </a:rPr>
-                        <a:t> </a:t>
-                      </a:r>
-                      <a:endParaRPr lang="en-US" sz="600" b="0" i="0" u="none" strike="noStrike">
-                        <a:solidFill>
-                          <a:srgbClr val="000000"/>
-                        </a:solidFill>
-                        <a:effectLst/>
-                        <a:latin typeface="Calibri"/>
-                      </a:endParaRPr>
-                    </a:p>
-                  </a:txBody>
-                  <a:tcPr marL="5627" marR="5627" marT="5627" marB="0" anchor="b"/>
-                </a:tc>
-                <a:tc>
-                  <a:txBody>
-                    <a:bodyPr/>
-                    <a:lstStyle/>
-                    <a:p>
-                      <a:pPr algn="r" fontAlgn="b"/>
-                      <a:r>
-                        <a:rPr lang="en-US" sz="600" u="none" strike="noStrike">
-                          <a:effectLst/>
-                        </a:rPr>
-                        <a:t>2</a:t>
-                      </a:r>
-                      <a:endParaRPr lang="en-US" sz="600" b="0" i="0" u="none" strike="noStrike">
-                        <a:solidFill>
-                          <a:srgbClr val="000000"/>
-                        </a:solidFill>
-                        <a:effectLst/>
-                        <a:latin typeface="Calibri"/>
-                      </a:endParaRPr>
-                    </a:p>
-                  </a:txBody>
-                  <a:tcPr marL="5627" marR="5627" marT="5627" marB="0" anchor="b"/>
-                </a:tc>
-                <a:tc>
-                  <a:txBody>
-                    <a:bodyPr/>
-                    <a:lstStyle/>
-                    <a:p>
-                      <a:pPr algn="l" fontAlgn="b"/>
-                      <a:endParaRPr lang="en-US" sz="600" b="0" i="0" u="none" strike="noStrike">
-                        <a:solidFill>
-                          <a:srgbClr val="000000"/>
-                        </a:solidFill>
-                        <a:effectLst/>
-                        <a:latin typeface="Calibri"/>
-                      </a:endParaRPr>
-                    </a:p>
-                  </a:txBody>
-                  <a:tcPr marL="5627" marR="5627" marT="5627" marB="0" anchor="b"/>
-                </a:tc>
-                <a:tc>
-                  <a:txBody>
-                    <a:bodyPr/>
-                    <a:lstStyle/>
-                    <a:p>
-                      <a:pPr algn="l" fontAlgn="b"/>
-                      <a:endParaRPr lang="en-US" sz="600" b="0" i="0" u="none" strike="noStrike">
-                        <a:solidFill>
-                          <a:srgbClr val="000000"/>
-                        </a:solidFill>
-                        <a:effectLst/>
-                        <a:latin typeface="Calibri"/>
-                      </a:endParaRPr>
-                    </a:p>
-                  </a:txBody>
-                  <a:tcPr marL="5627" marR="5627" marT="5627" marB="0" anchor="b"/>
-                </a:tc>
-                <a:tc>
-                  <a:txBody>
-                    <a:bodyPr/>
-                    <a:lstStyle/>
-                    <a:p>
-                      <a:pPr algn="l" fontAlgn="b"/>
-                      <a:endParaRPr lang="en-US" sz="600" b="0" i="0" u="none" strike="noStrike">
-                        <a:solidFill>
-                          <a:srgbClr val="000000"/>
-                        </a:solidFill>
-                        <a:effectLst/>
-                        <a:latin typeface="Calibri"/>
-                      </a:endParaRPr>
-                    </a:p>
-                  </a:txBody>
-                  <a:tcPr marL="5627" marR="5627" marT="5627" marB="0" anchor="b"/>
-                </a:tc>
-                <a:tc>
-                  <a:txBody>
-                    <a:bodyPr/>
-                    <a:lstStyle/>
-                    <a:p>
-                      <a:pPr algn="l" fontAlgn="b"/>
-                      <a:endParaRPr lang="en-US" sz="600" b="0" i="0" u="none" strike="noStrike">
-                        <a:solidFill>
-                          <a:srgbClr val="000000"/>
-                        </a:solidFill>
-                        <a:effectLst/>
-                        <a:latin typeface="Calibri"/>
-                      </a:endParaRPr>
-                    </a:p>
-                  </a:txBody>
-                  <a:tcPr marL="5627" marR="5627" marT="5627" marB="0" anchor="b"/>
-                </a:tc>
-              </a:tr>
-              <a:tr h="119677">
-                <a:tc>
-                  <a:txBody>
-                    <a:bodyPr/>
-                    <a:lstStyle/>
-                    <a:p>
-                      <a:pPr algn="l" fontAlgn="b"/>
-                      <a:r>
-                        <a:rPr lang="en-US" sz="600" u="none" strike="noStrike">
-                          <a:effectLst/>
-                        </a:rPr>
-                        <a:t> </a:t>
-                      </a:r>
-                      <a:endParaRPr lang="en-US" sz="600" b="0" i="0" u="none" strike="noStrike">
-                        <a:solidFill>
-                          <a:srgbClr val="000000"/>
-                        </a:solidFill>
-                        <a:effectLst/>
-                        <a:latin typeface="Calibri"/>
-                      </a:endParaRPr>
-                    </a:p>
-                  </a:txBody>
-                  <a:tcPr marL="5627" marR="5627" marT="5627" marB="0" anchor="b"/>
-                </a:tc>
-                <a:tc>
-                  <a:txBody>
-                    <a:bodyPr/>
-                    <a:lstStyle/>
-                    <a:p>
-                      <a:pPr algn="l" fontAlgn="b"/>
-                      <a:r>
-                        <a:rPr lang="en-US" sz="600" u="none" strike="noStrike">
-                          <a:effectLst/>
-                        </a:rPr>
-                        <a:t> </a:t>
-                      </a:r>
-                      <a:endParaRPr lang="en-US" sz="600" b="0" i="0" u="none" strike="noStrike">
-                        <a:solidFill>
-                          <a:srgbClr val="000000"/>
-                        </a:solidFill>
-                        <a:effectLst/>
-                        <a:latin typeface="Calibri"/>
-                      </a:endParaRPr>
-                    </a:p>
-                  </a:txBody>
-                  <a:tcPr marL="5627" marR="5627" marT="5627" marB="0" anchor="b"/>
-                </a:tc>
-                <a:tc>
-                  <a:txBody>
-                    <a:bodyPr/>
-                    <a:lstStyle/>
-                    <a:p>
-                      <a:pPr algn="l" fontAlgn="b"/>
-                      <a:r>
-                        <a:rPr lang="en-US" sz="600" u="none" strike="noStrike">
-                          <a:effectLst/>
-                        </a:rPr>
-                        <a:t>Implement Feedback</a:t>
-                      </a:r>
-                      <a:endParaRPr lang="en-US" sz="600" b="0" i="0" u="none" strike="noStrike">
-                        <a:solidFill>
-                          <a:srgbClr val="000000"/>
-                        </a:solidFill>
-                        <a:effectLst/>
-                        <a:latin typeface="Calibri"/>
-                      </a:endParaRPr>
-                    </a:p>
-                  </a:txBody>
-                  <a:tcPr marL="5627" marR="5627" marT="5627" marB="0" anchor="b"/>
-                </a:tc>
-                <a:tc>
-                  <a:txBody>
-                    <a:bodyPr/>
-                    <a:lstStyle/>
-                    <a:p>
-                      <a:pPr algn="l" fontAlgn="b"/>
-                      <a:r>
-                        <a:rPr lang="en-US" sz="600" u="none" strike="noStrike">
-                          <a:effectLst/>
-                        </a:rPr>
-                        <a:t> </a:t>
-                      </a:r>
-                      <a:endParaRPr lang="en-US" sz="600" b="0" i="0" u="none" strike="noStrike">
-                        <a:solidFill>
-                          <a:srgbClr val="000000"/>
-                        </a:solidFill>
-                        <a:effectLst/>
-                        <a:latin typeface="Calibri"/>
-                      </a:endParaRPr>
-                    </a:p>
-                  </a:txBody>
-                  <a:tcPr marL="5627" marR="5627" marT="5627" marB="0" anchor="b"/>
-                </a:tc>
-                <a:tc>
-                  <a:txBody>
-                    <a:bodyPr/>
-                    <a:lstStyle/>
-                    <a:p>
-                      <a:pPr algn="l" fontAlgn="b"/>
-                      <a:r>
-                        <a:rPr lang="en-US" sz="600" u="none" strike="noStrike">
-                          <a:effectLst/>
-                        </a:rPr>
-                        <a:t>Team</a:t>
-                      </a:r>
-                      <a:endParaRPr lang="en-US" sz="600" b="0" i="0" u="none" strike="noStrike">
-                        <a:solidFill>
-                          <a:srgbClr val="000000"/>
-                        </a:solidFill>
-                        <a:effectLst/>
-                        <a:latin typeface="Calibri"/>
-                      </a:endParaRPr>
-                    </a:p>
-                  </a:txBody>
-                  <a:tcPr marL="5627" marR="5627" marT="5627" marB="0" anchor="b"/>
-                </a:tc>
-                <a:tc>
-                  <a:txBody>
-                    <a:bodyPr/>
-                    <a:lstStyle/>
-                    <a:p>
-                      <a:pPr algn="r" fontAlgn="b"/>
-                      <a:r>
-                        <a:rPr lang="en-US" sz="600" u="none" strike="noStrike">
-                          <a:effectLst/>
-                        </a:rPr>
-                        <a:t>2</a:t>
-                      </a:r>
-                      <a:endParaRPr lang="en-US" sz="600" b="0" i="0" u="none" strike="noStrike">
-                        <a:solidFill>
-                          <a:srgbClr val="000000"/>
-                        </a:solidFill>
-                        <a:effectLst/>
-                        <a:latin typeface="Calibri"/>
-                      </a:endParaRPr>
-                    </a:p>
-                  </a:txBody>
-                  <a:tcPr marL="5627" marR="5627" marT="5627" marB="0" anchor="b"/>
-                </a:tc>
-                <a:tc>
-                  <a:txBody>
-                    <a:bodyPr/>
-                    <a:lstStyle/>
-                    <a:p>
-                      <a:pPr algn="l" fontAlgn="b"/>
-                      <a:r>
-                        <a:rPr lang="en-US" sz="600" u="none" strike="noStrike">
-                          <a:effectLst/>
-                        </a:rPr>
-                        <a:t> </a:t>
-                      </a:r>
-                      <a:endParaRPr lang="en-US" sz="600" b="0" i="0" u="none" strike="noStrike">
-                        <a:solidFill>
-                          <a:srgbClr val="000000"/>
-                        </a:solidFill>
-                        <a:effectLst/>
-                        <a:latin typeface="Calibri"/>
-                      </a:endParaRPr>
-                    </a:p>
-                  </a:txBody>
-                  <a:tcPr marL="5627" marR="5627" marT="5627" marB="0" anchor="b"/>
-                </a:tc>
-                <a:tc>
-                  <a:txBody>
-                    <a:bodyPr/>
-                    <a:lstStyle/>
-                    <a:p>
-                      <a:pPr algn="r" fontAlgn="b"/>
-                      <a:r>
-                        <a:rPr lang="en-US" sz="600" u="none" strike="noStrike">
-                          <a:effectLst/>
-                        </a:rPr>
-                        <a:t>1</a:t>
-                      </a:r>
-                      <a:endParaRPr lang="en-US" sz="600" b="0" i="0" u="none" strike="noStrike">
-                        <a:solidFill>
-                          <a:srgbClr val="000000"/>
-                        </a:solidFill>
-                        <a:effectLst/>
-                        <a:latin typeface="Calibri"/>
-                      </a:endParaRPr>
-                    </a:p>
-                  </a:txBody>
-                  <a:tcPr marL="5627" marR="5627" marT="5627" marB="0" anchor="b"/>
-                </a:tc>
-                <a:tc>
-                  <a:txBody>
-                    <a:bodyPr/>
-                    <a:lstStyle/>
-                    <a:p>
-                      <a:pPr algn="l" fontAlgn="b"/>
-                      <a:endParaRPr lang="en-US" sz="600" b="0" i="0" u="none" strike="noStrike">
-                        <a:solidFill>
-                          <a:srgbClr val="000000"/>
-                        </a:solidFill>
-                        <a:effectLst/>
-                        <a:latin typeface="Calibri"/>
-                      </a:endParaRPr>
-                    </a:p>
-                  </a:txBody>
-                  <a:tcPr marL="5627" marR="5627" marT="5627" marB="0" anchor="b"/>
-                </a:tc>
-                <a:tc>
-                  <a:txBody>
-                    <a:bodyPr/>
-                    <a:lstStyle/>
-                    <a:p>
-                      <a:pPr algn="l" fontAlgn="b"/>
-                      <a:endParaRPr lang="en-US" sz="600" b="0" i="0" u="none" strike="noStrike">
-                        <a:solidFill>
-                          <a:srgbClr val="000000"/>
-                        </a:solidFill>
-                        <a:effectLst/>
-                        <a:latin typeface="Calibri"/>
-                      </a:endParaRPr>
-                    </a:p>
-                  </a:txBody>
-                  <a:tcPr marL="5627" marR="5627" marT="5627" marB="0" anchor="b"/>
-                </a:tc>
-                <a:tc>
-                  <a:txBody>
-                    <a:bodyPr/>
-                    <a:lstStyle/>
-                    <a:p>
-                      <a:pPr algn="l" fontAlgn="b"/>
-                      <a:endParaRPr lang="en-US" sz="600" b="0" i="0" u="none" strike="noStrike">
-                        <a:solidFill>
-                          <a:srgbClr val="000000"/>
-                        </a:solidFill>
-                        <a:effectLst/>
-                        <a:latin typeface="Calibri"/>
-                      </a:endParaRPr>
-                    </a:p>
-                  </a:txBody>
-                  <a:tcPr marL="5627" marR="5627" marT="5627" marB="0" anchor="b"/>
-                </a:tc>
-                <a:tc>
-                  <a:txBody>
-                    <a:bodyPr/>
-                    <a:lstStyle/>
-                    <a:p>
-                      <a:pPr algn="l" fontAlgn="b"/>
-                      <a:endParaRPr lang="en-US" sz="600" b="0" i="0" u="none" strike="noStrike">
-                        <a:solidFill>
-                          <a:srgbClr val="000000"/>
-                        </a:solidFill>
-                        <a:effectLst/>
-                        <a:latin typeface="Calibri"/>
-                      </a:endParaRPr>
-                    </a:p>
-                  </a:txBody>
-                  <a:tcPr marL="5627" marR="5627" marT="5627" marB="0" anchor="b"/>
-                </a:tc>
-              </a:tr>
-              <a:tr h="119677">
-                <a:tc>
-                  <a:txBody>
-                    <a:bodyPr/>
-                    <a:lstStyle/>
-                    <a:p>
-                      <a:pPr algn="l" fontAlgn="b"/>
-                      <a:r>
-                        <a:rPr lang="en-US" sz="600" u="none" strike="noStrike">
-                          <a:effectLst/>
-                        </a:rPr>
-                        <a:t> </a:t>
-                      </a:r>
-                      <a:endParaRPr lang="en-US" sz="600" b="0" i="0" u="none" strike="noStrike">
-                        <a:solidFill>
-                          <a:srgbClr val="000000"/>
-                        </a:solidFill>
-                        <a:effectLst/>
-                        <a:latin typeface="Calibri"/>
-                      </a:endParaRPr>
-                    </a:p>
-                  </a:txBody>
-                  <a:tcPr marL="5627" marR="5627" marT="5627" marB="0" anchor="b"/>
-                </a:tc>
-                <a:tc>
-                  <a:txBody>
-                    <a:bodyPr/>
-                    <a:lstStyle/>
-                    <a:p>
-                      <a:pPr algn="l" fontAlgn="b"/>
-                      <a:r>
-                        <a:rPr lang="en-US" sz="600" u="none" strike="noStrike">
-                          <a:effectLst/>
-                        </a:rPr>
-                        <a:t> </a:t>
-                      </a:r>
-                      <a:endParaRPr lang="en-US" sz="600" b="0" i="0" u="none" strike="noStrike">
-                        <a:solidFill>
-                          <a:srgbClr val="000000"/>
-                        </a:solidFill>
-                        <a:effectLst/>
-                        <a:latin typeface="Calibri"/>
-                      </a:endParaRPr>
-                    </a:p>
-                  </a:txBody>
-                  <a:tcPr marL="5627" marR="5627" marT="5627" marB="0" anchor="b"/>
-                </a:tc>
-                <a:tc>
-                  <a:txBody>
-                    <a:bodyPr/>
-                    <a:lstStyle/>
-                    <a:p>
-                      <a:pPr algn="l" fontAlgn="b"/>
-                      <a:r>
-                        <a:rPr lang="en-US" sz="600" u="none" strike="noStrike">
-                          <a:effectLst/>
-                        </a:rPr>
-                        <a:t>Sprint Story Creation</a:t>
-                      </a:r>
-                      <a:endParaRPr lang="en-US" sz="600" b="0" i="0" u="none" strike="noStrike">
-                        <a:solidFill>
-                          <a:srgbClr val="000000"/>
-                        </a:solidFill>
-                        <a:effectLst/>
-                        <a:latin typeface="Calibri"/>
-                      </a:endParaRPr>
-                    </a:p>
-                  </a:txBody>
-                  <a:tcPr marL="5627" marR="5627" marT="5627" marB="0" anchor="b"/>
-                </a:tc>
-                <a:tc>
-                  <a:txBody>
-                    <a:bodyPr/>
-                    <a:lstStyle/>
-                    <a:p>
-                      <a:pPr algn="l" fontAlgn="b"/>
-                      <a:r>
-                        <a:rPr lang="en-US" sz="600" u="none" strike="noStrike">
-                          <a:effectLst/>
-                        </a:rPr>
-                        <a:t>Implementation</a:t>
-                      </a:r>
-                      <a:endParaRPr lang="en-US" sz="600" b="0" i="0" u="none" strike="noStrike">
-                        <a:solidFill>
-                          <a:srgbClr val="000000"/>
-                        </a:solidFill>
-                        <a:effectLst/>
-                        <a:latin typeface="Calibri"/>
-                      </a:endParaRPr>
-                    </a:p>
-                  </a:txBody>
-                  <a:tcPr marL="5627" marR="5627" marT="5627" marB="0" anchor="b"/>
-                </a:tc>
-                <a:tc>
-                  <a:txBody>
-                    <a:bodyPr/>
-                    <a:lstStyle/>
-                    <a:p>
-                      <a:pPr algn="l" fontAlgn="b"/>
-                      <a:r>
-                        <a:rPr lang="en-US" sz="600" u="none" strike="noStrike">
-                          <a:effectLst/>
-                        </a:rPr>
-                        <a:t> </a:t>
-                      </a:r>
-                      <a:endParaRPr lang="en-US" sz="600" b="0" i="0" u="none" strike="noStrike">
-                        <a:solidFill>
-                          <a:srgbClr val="000000"/>
-                        </a:solidFill>
-                        <a:effectLst/>
-                        <a:latin typeface="Calibri"/>
-                      </a:endParaRPr>
-                    </a:p>
-                  </a:txBody>
-                  <a:tcPr marL="5627" marR="5627" marT="5627" marB="0" anchor="b"/>
-                </a:tc>
-                <a:tc>
-                  <a:txBody>
-                    <a:bodyPr/>
-                    <a:lstStyle/>
-                    <a:p>
-                      <a:pPr algn="r" fontAlgn="b"/>
-                      <a:r>
-                        <a:rPr lang="en-US" sz="600" u="none" strike="noStrike">
-                          <a:effectLst/>
-                        </a:rPr>
-                        <a:t>4</a:t>
-                      </a:r>
-                      <a:endParaRPr lang="en-US" sz="600" b="0" i="0" u="none" strike="noStrike">
-                        <a:solidFill>
-                          <a:srgbClr val="000000"/>
-                        </a:solidFill>
-                        <a:effectLst/>
-                        <a:latin typeface="Calibri"/>
-                      </a:endParaRPr>
-                    </a:p>
-                  </a:txBody>
-                  <a:tcPr marL="5627" marR="5627" marT="5627" marB="0" anchor="b"/>
-                </a:tc>
-                <a:tc>
-                  <a:txBody>
-                    <a:bodyPr/>
-                    <a:lstStyle/>
-                    <a:p>
-                      <a:pPr algn="l" fontAlgn="b"/>
-                      <a:r>
-                        <a:rPr lang="en-US" sz="600" u="none" strike="noStrike">
-                          <a:effectLst/>
-                        </a:rPr>
-                        <a:t> </a:t>
-                      </a:r>
-                      <a:endParaRPr lang="en-US" sz="600" b="0" i="0" u="none" strike="noStrike">
-                        <a:solidFill>
-                          <a:srgbClr val="000000"/>
-                        </a:solidFill>
-                        <a:effectLst/>
-                        <a:latin typeface="Calibri"/>
-                      </a:endParaRPr>
-                    </a:p>
-                  </a:txBody>
-                  <a:tcPr marL="5627" marR="5627" marT="5627" marB="0" anchor="b"/>
-                </a:tc>
-                <a:tc>
-                  <a:txBody>
-                    <a:bodyPr/>
-                    <a:lstStyle/>
-                    <a:p>
-                      <a:pPr algn="r" fontAlgn="b"/>
-                      <a:r>
-                        <a:rPr lang="en-US" sz="600" u="none" strike="noStrike">
-                          <a:effectLst/>
-                        </a:rPr>
-                        <a:t>4</a:t>
-                      </a:r>
-                      <a:endParaRPr lang="en-US" sz="600" b="0" i="0" u="none" strike="noStrike">
-                        <a:solidFill>
-                          <a:srgbClr val="000000"/>
-                        </a:solidFill>
-                        <a:effectLst/>
-                        <a:latin typeface="Calibri"/>
-                      </a:endParaRPr>
-                    </a:p>
-                  </a:txBody>
-                  <a:tcPr marL="5627" marR="5627" marT="5627" marB="0" anchor="b"/>
-                </a:tc>
-                <a:tc>
-                  <a:txBody>
-                    <a:bodyPr/>
-                    <a:lstStyle/>
-                    <a:p>
-                      <a:pPr algn="l" fontAlgn="b"/>
-                      <a:endParaRPr lang="en-US" sz="600" b="0" i="0" u="none" strike="noStrike">
-                        <a:solidFill>
-                          <a:srgbClr val="000000"/>
-                        </a:solidFill>
-                        <a:effectLst/>
-                        <a:latin typeface="Calibri"/>
-                      </a:endParaRPr>
-                    </a:p>
-                  </a:txBody>
-                  <a:tcPr marL="5627" marR="5627" marT="5627" marB="0" anchor="b"/>
-                </a:tc>
-                <a:tc>
-                  <a:txBody>
-                    <a:bodyPr/>
-                    <a:lstStyle/>
-                    <a:p>
-                      <a:pPr algn="l" fontAlgn="b"/>
-                      <a:endParaRPr lang="en-US" sz="600" b="0" i="0" u="none" strike="noStrike">
-                        <a:solidFill>
-                          <a:srgbClr val="000000"/>
-                        </a:solidFill>
-                        <a:effectLst/>
-                        <a:latin typeface="Calibri"/>
-                      </a:endParaRPr>
-                    </a:p>
-                  </a:txBody>
-                  <a:tcPr marL="5627" marR="5627" marT="5627" marB="0" anchor="b"/>
-                </a:tc>
-                <a:tc>
-                  <a:txBody>
-                    <a:bodyPr/>
-                    <a:lstStyle/>
-                    <a:p>
-                      <a:pPr algn="l" fontAlgn="b"/>
-                      <a:endParaRPr lang="en-US" sz="600" b="0" i="0" u="none" strike="noStrike">
-                        <a:solidFill>
-                          <a:srgbClr val="000000"/>
-                        </a:solidFill>
-                        <a:effectLst/>
-                        <a:latin typeface="Calibri"/>
-                      </a:endParaRPr>
-                    </a:p>
-                  </a:txBody>
-                  <a:tcPr marL="5627" marR="5627" marT="5627" marB="0" anchor="b"/>
-                </a:tc>
-                <a:tc>
-                  <a:txBody>
-                    <a:bodyPr/>
-                    <a:lstStyle/>
-                    <a:p>
-                      <a:pPr algn="l" fontAlgn="b"/>
-                      <a:endParaRPr lang="en-US" sz="600" b="0" i="0" u="none" strike="noStrike">
-                        <a:solidFill>
-                          <a:srgbClr val="000000"/>
-                        </a:solidFill>
-                        <a:effectLst/>
-                        <a:latin typeface="Calibri"/>
-                      </a:endParaRPr>
-                    </a:p>
-                  </a:txBody>
-                  <a:tcPr marL="5627" marR="5627" marT="5627" marB="0" anchor="b"/>
-                </a:tc>
-              </a:tr>
-              <a:tr h="119677">
-                <a:tc>
-                  <a:txBody>
-                    <a:bodyPr/>
-                    <a:lstStyle/>
-                    <a:p>
-                      <a:pPr algn="l" fontAlgn="b"/>
-                      <a:r>
-                        <a:rPr lang="en-US" sz="600" u="none" strike="noStrike">
-                          <a:effectLst/>
-                        </a:rPr>
-                        <a:t> </a:t>
-                      </a:r>
-                      <a:endParaRPr lang="en-US" sz="600" b="0" i="0" u="none" strike="noStrike">
-                        <a:solidFill>
-                          <a:srgbClr val="000000"/>
-                        </a:solidFill>
-                        <a:effectLst/>
-                        <a:latin typeface="Calibri"/>
-                      </a:endParaRPr>
-                    </a:p>
-                  </a:txBody>
-                  <a:tcPr marL="5627" marR="5627" marT="5627" marB="0" anchor="b"/>
-                </a:tc>
-                <a:tc>
-                  <a:txBody>
-                    <a:bodyPr/>
-                    <a:lstStyle/>
-                    <a:p>
-                      <a:pPr algn="l" fontAlgn="b"/>
-                      <a:r>
-                        <a:rPr lang="en-US" sz="600" u="none" strike="noStrike">
-                          <a:effectLst/>
-                        </a:rPr>
-                        <a:t> </a:t>
-                      </a:r>
-                      <a:endParaRPr lang="en-US" sz="600" b="0" i="0" u="none" strike="noStrike">
-                        <a:solidFill>
-                          <a:srgbClr val="000000"/>
-                        </a:solidFill>
-                        <a:effectLst/>
-                        <a:latin typeface="Calibri"/>
-                      </a:endParaRPr>
-                    </a:p>
-                  </a:txBody>
-                  <a:tcPr marL="5627" marR="5627" marT="5627" marB="0" anchor="b"/>
-                </a:tc>
-                <a:tc>
-                  <a:txBody>
-                    <a:bodyPr/>
-                    <a:lstStyle/>
-                    <a:p>
-                      <a:pPr algn="l" fontAlgn="b"/>
-                      <a:r>
-                        <a:rPr lang="en-US" sz="600" u="none" strike="noStrike">
-                          <a:effectLst/>
-                        </a:rPr>
-                        <a:t>Sprint Story Management</a:t>
-                      </a:r>
-                      <a:endParaRPr lang="en-US" sz="600" b="0" i="0" u="none" strike="noStrike">
-                        <a:solidFill>
-                          <a:srgbClr val="000000"/>
-                        </a:solidFill>
-                        <a:effectLst/>
-                        <a:latin typeface="Calibri"/>
-                      </a:endParaRPr>
-                    </a:p>
-                  </a:txBody>
-                  <a:tcPr marL="5627" marR="5627" marT="5627" marB="0" anchor="b"/>
-                </a:tc>
-                <a:tc>
-                  <a:txBody>
-                    <a:bodyPr/>
-                    <a:lstStyle/>
-                    <a:p>
-                      <a:pPr algn="l" fontAlgn="b"/>
-                      <a:r>
-                        <a:rPr lang="en-US" sz="600" u="none" strike="noStrike">
-                          <a:effectLst/>
-                        </a:rPr>
-                        <a:t>Implementation</a:t>
-                      </a:r>
-                      <a:endParaRPr lang="en-US" sz="600" b="0" i="0" u="none" strike="noStrike">
-                        <a:solidFill>
-                          <a:srgbClr val="000000"/>
-                        </a:solidFill>
-                        <a:effectLst/>
-                        <a:latin typeface="Calibri"/>
-                      </a:endParaRPr>
-                    </a:p>
-                  </a:txBody>
-                  <a:tcPr marL="5627" marR="5627" marT="5627" marB="0" anchor="b"/>
-                </a:tc>
-                <a:tc>
-                  <a:txBody>
-                    <a:bodyPr/>
-                    <a:lstStyle/>
-                    <a:p>
-                      <a:pPr algn="l" fontAlgn="b"/>
-                      <a:r>
-                        <a:rPr lang="en-US" sz="600" u="none" strike="noStrike">
-                          <a:effectLst/>
-                        </a:rPr>
-                        <a:t> </a:t>
-                      </a:r>
-                      <a:endParaRPr lang="en-US" sz="600" b="0" i="0" u="none" strike="noStrike">
-                        <a:solidFill>
-                          <a:srgbClr val="000000"/>
-                        </a:solidFill>
-                        <a:effectLst/>
-                        <a:latin typeface="Calibri"/>
-                      </a:endParaRPr>
-                    </a:p>
-                  </a:txBody>
-                  <a:tcPr marL="5627" marR="5627" marT="5627" marB="0" anchor="b"/>
-                </a:tc>
-                <a:tc>
-                  <a:txBody>
-                    <a:bodyPr/>
-                    <a:lstStyle/>
-                    <a:p>
-                      <a:pPr algn="r" fontAlgn="b"/>
-                      <a:r>
-                        <a:rPr lang="en-US" sz="600" u="none" strike="noStrike">
-                          <a:effectLst/>
-                        </a:rPr>
-                        <a:t>4</a:t>
-                      </a:r>
-                      <a:endParaRPr lang="en-US" sz="600" b="0" i="0" u="none" strike="noStrike">
-                        <a:solidFill>
-                          <a:srgbClr val="000000"/>
-                        </a:solidFill>
-                        <a:effectLst/>
-                        <a:latin typeface="Calibri"/>
-                      </a:endParaRPr>
-                    </a:p>
-                  </a:txBody>
-                  <a:tcPr marL="5627" marR="5627" marT="5627" marB="0" anchor="b"/>
-                </a:tc>
-                <a:tc>
-                  <a:txBody>
-                    <a:bodyPr/>
-                    <a:lstStyle/>
-                    <a:p>
-                      <a:pPr algn="l" fontAlgn="b"/>
-                      <a:r>
-                        <a:rPr lang="en-US" sz="600" u="none" strike="noStrike">
-                          <a:effectLst/>
-                        </a:rPr>
-                        <a:t> </a:t>
-                      </a:r>
-                      <a:endParaRPr lang="en-US" sz="600" b="0" i="0" u="none" strike="noStrike">
-                        <a:solidFill>
-                          <a:srgbClr val="000000"/>
-                        </a:solidFill>
-                        <a:effectLst/>
-                        <a:latin typeface="Calibri"/>
-                      </a:endParaRPr>
-                    </a:p>
-                  </a:txBody>
-                  <a:tcPr marL="5627" marR="5627" marT="5627" marB="0" anchor="b"/>
-                </a:tc>
-                <a:tc>
-                  <a:txBody>
-                    <a:bodyPr/>
-                    <a:lstStyle/>
-                    <a:p>
-                      <a:pPr algn="r" fontAlgn="b"/>
-                      <a:r>
-                        <a:rPr lang="en-US" sz="600" u="none" strike="noStrike">
-                          <a:effectLst/>
-                        </a:rPr>
-                        <a:t>4</a:t>
-                      </a:r>
-                      <a:endParaRPr lang="en-US" sz="600" b="0" i="0" u="none" strike="noStrike">
-                        <a:solidFill>
-                          <a:srgbClr val="000000"/>
-                        </a:solidFill>
-                        <a:effectLst/>
-                        <a:latin typeface="Calibri"/>
-                      </a:endParaRPr>
-                    </a:p>
-                  </a:txBody>
-                  <a:tcPr marL="5627" marR="5627" marT="5627" marB="0" anchor="b"/>
-                </a:tc>
-                <a:tc>
-                  <a:txBody>
-                    <a:bodyPr/>
-                    <a:lstStyle/>
-                    <a:p>
-                      <a:pPr algn="l" fontAlgn="b"/>
-                      <a:endParaRPr lang="en-US" sz="600" b="0" i="0" u="none" strike="noStrike">
-                        <a:solidFill>
-                          <a:srgbClr val="000000"/>
-                        </a:solidFill>
-                        <a:effectLst/>
-                        <a:latin typeface="Calibri"/>
-                      </a:endParaRPr>
-                    </a:p>
-                  </a:txBody>
-                  <a:tcPr marL="5627" marR="5627" marT="5627" marB="0" anchor="b"/>
-                </a:tc>
-                <a:tc>
-                  <a:txBody>
-                    <a:bodyPr/>
-                    <a:lstStyle/>
-                    <a:p>
-                      <a:pPr algn="l" fontAlgn="b"/>
-                      <a:endParaRPr lang="en-US" sz="600" b="0" i="0" u="none" strike="noStrike">
-                        <a:solidFill>
-                          <a:srgbClr val="000000"/>
-                        </a:solidFill>
-                        <a:effectLst/>
-                        <a:latin typeface="Calibri"/>
-                      </a:endParaRPr>
-                    </a:p>
-                  </a:txBody>
-                  <a:tcPr marL="5627" marR="5627" marT="5627" marB="0" anchor="b"/>
-                </a:tc>
-                <a:tc>
-                  <a:txBody>
-                    <a:bodyPr/>
-                    <a:lstStyle/>
-                    <a:p>
-                      <a:pPr algn="l" fontAlgn="b"/>
-                      <a:endParaRPr lang="en-US" sz="600" b="0" i="0" u="none" strike="noStrike">
-                        <a:solidFill>
-                          <a:srgbClr val="000000"/>
-                        </a:solidFill>
-                        <a:effectLst/>
-                        <a:latin typeface="Calibri"/>
-                      </a:endParaRPr>
-                    </a:p>
-                  </a:txBody>
-                  <a:tcPr marL="5627" marR="5627" marT="5627" marB="0" anchor="b"/>
-                </a:tc>
-                <a:tc>
-                  <a:txBody>
-                    <a:bodyPr/>
-                    <a:lstStyle/>
-                    <a:p>
-                      <a:pPr algn="l" fontAlgn="b"/>
-                      <a:endParaRPr lang="en-US" sz="600" b="0" i="0" u="none" strike="noStrike">
-                        <a:solidFill>
-                          <a:srgbClr val="000000"/>
-                        </a:solidFill>
-                        <a:effectLst/>
-                        <a:latin typeface="Calibri"/>
-                      </a:endParaRPr>
-                    </a:p>
-                  </a:txBody>
-                  <a:tcPr marL="5627" marR="5627" marT="5627" marB="0" anchor="b"/>
-                </a:tc>
-              </a:tr>
-              <a:tr h="119677">
-                <a:tc>
-                  <a:txBody>
-                    <a:bodyPr/>
-                    <a:lstStyle/>
-                    <a:p>
-                      <a:pPr algn="l" fontAlgn="b"/>
-                      <a:r>
-                        <a:rPr lang="en-US" sz="600" u="none" strike="noStrike">
-                          <a:effectLst/>
-                        </a:rPr>
-                        <a:t> </a:t>
-                      </a:r>
-                      <a:endParaRPr lang="en-US" sz="600" b="0" i="0" u="none" strike="noStrike">
-                        <a:solidFill>
-                          <a:srgbClr val="000000"/>
-                        </a:solidFill>
-                        <a:effectLst/>
-                        <a:latin typeface="Calibri"/>
-                      </a:endParaRPr>
-                    </a:p>
-                  </a:txBody>
-                  <a:tcPr marL="5627" marR="5627" marT="5627" marB="0" anchor="b"/>
-                </a:tc>
-                <a:tc>
-                  <a:txBody>
-                    <a:bodyPr/>
-                    <a:lstStyle/>
-                    <a:p>
-                      <a:pPr algn="l" fontAlgn="b"/>
-                      <a:r>
-                        <a:rPr lang="en-US" sz="600" u="none" strike="noStrike">
-                          <a:effectLst/>
-                        </a:rPr>
-                        <a:t> </a:t>
-                      </a:r>
-                      <a:endParaRPr lang="en-US" sz="600" b="0" i="0" u="none" strike="noStrike">
-                        <a:solidFill>
-                          <a:srgbClr val="000000"/>
-                        </a:solidFill>
-                        <a:effectLst/>
-                        <a:latin typeface="Calibri"/>
-                      </a:endParaRPr>
-                    </a:p>
-                  </a:txBody>
-                  <a:tcPr marL="5627" marR="5627" marT="5627" marB="0" anchor="b"/>
-                </a:tc>
-                <a:tc>
-                  <a:txBody>
-                    <a:bodyPr/>
-                    <a:lstStyle/>
-                    <a:p>
-                      <a:pPr algn="l" fontAlgn="b"/>
-                      <a:r>
-                        <a:rPr lang="en-US" sz="600" u="none" strike="noStrike">
-                          <a:effectLst/>
-                        </a:rPr>
-                        <a:t>Reports</a:t>
-                      </a:r>
-                      <a:endParaRPr lang="en-US" sz="600" b="0" i="0" u="none" strike="noStrike">
-                        <a:solidFill>
-                          <a:srgbClr val="000000"/>
-                        </a:solidFill>
-                        <a:effectLst/>
-                        <a:latin typeface="Calibri"/>
-                      </a:endParaRPr>
-                    </a:p>
-                  </a:txBody>
-                  <a:tcPr marL="5627" marR="5627" marT="5627" marB="0" anchor="b"/>
-                </a:tc>
-                <a:tc>
-                  <a:txBody>
-                    <a:bodyPr/>
-                    <a:lstStyle/>
-                    <a:p>
-                      <a:pPr algn="l" fontAlgn="b"/>
-                      <a:r>
-                        <a:rPr lang="en-US" sz="600" u="none" strike="noStrike">
-                          <a:effectLst/>
-                        </a:rPr>
-                        <a:t>Design layout</a:t>
-                      </a:r>
-                      <a:endParaRPr lang="en-US" sz="600" b="0" i="0" u="none" strike="noStrike">
-                        <a:solidFill>
-                          <a:srgbClr val="000000"/>
-                        </a:solidFill>
-                        <a:effectLst/>
-                        <a:latin typeface="Calibri"/>
-                      </a:endParaRPr>
-                    </a:p>
-                  </a:txBody>
-                  <a:tcPr marL="5627" marR="5627" marT="5627" marB="0" anchor="b"/>
-                </a:tc>
-                <a:tc>
-                  <a:txBody>
-                    <a:bodyPr/>
-                    <a:lstStyle/>
-                    <a:p>
-                      <a:pPr algn="l" fontAlgn="b"/>
-                      <a:r>
-                        <a:rPr lang="en-US" sz="600" u="none" strike="noStrike">
-                          <a:effectLst/>
-                        </a:rPr>
-                        <a:t> </a:t>
-                      </a:r>
-                      <a:endParaRPr lang="en-US" sz="600" b="0" i="0" u="none" strike="noStrike">
-                        <a:solidFill>
-                          <a:srgbClr val="000000"/>
-                        </a:solidFill>
-                        <a:effectLst/>
-                        <a:latin typeface="Calibri"/>
-                      </a:endParaRPr>
-                    </a:p>
-                  </a:txBody>
-                  <a:tcPr marL="5627" marR="5627" marT="5627" marB="0" anchor="b"/>
-                </a:tc>
-                <a:tc>
-                  <a:txBody>
-                    <a:bodyPr/>
-                    <a:lstStyle/>
-                    <a:p>
-                      <a:pPr algn="r" fontAlgn="b"/>
-                      <a:r>
-                        <a:rPr lang="en-US" sz="600" u="none" strike="noStrike">
-                          <a:effectLst/>
-                        </a:rPr>
-                        <a:t>2</a:t>
-                      </a:r>
-                      <a:endParaRPr lang="en-US" sz="600" b="0" i="0" u="none" strike="noStrike">
-                        <a:solidFill>
-                          <a:srgbClr val="000000"/>
-                        </a:solidFill>
-                        <a:effectLst/>
-                        <a:latin typeface="Calibri"/>
-                      </a:endParaRPr>
-                    </a:p>
-                  </a:txBody>
-                  <a:tcPr marL="5627" marR="5627" marT="5627" marB="0" anchor="b"/>
-                </a:tc>
-                <a:tc>
-                  <a:txBody>
-                    <a:bodyPr/>
-                    <a:lstStyle/>
-                    <a:p>
-                      <a:pPr algn="l" fontAlgn="b"/>
-                      <a:r>
-                        <a:rPr lang="en-US" sz="600" u="none" strike="noStrike">
-                          <a:effectLst/>
-                        </a:rPr>
-                        <a:t> </a:t>
-                      </a:r>
-                      <a:endParaRPr lang="en-US" sz="600" b="0" i="0" u="none" strike="noStrike">
-                        <a:solidFill>
-                          <a:srgbClr val="000000"/>
-                        </a:solidFill>
-                        <a:effectLst/>
-                        <a:latin typeface="Calibri"/>
-                      </a:endParaRPr>
-                    </a:p>
-                  </a:txBody>
-                  <a:tcPr marL="5627" marR="5627" marT="5627" marB="0" anchor="b"/>
-                </a:tc>
-                <a:tc>
-                  <a:txBody>
-                    <a:bodyPr/>
-                    <a:lstStyle/>
-                    <a:p>
-                      <a:pPr algn="r" fontAlgn="b"/>
-                      <a:r>
-                        <a:rPr lang="en-US" sz="600" u="none" strike="noStrike">
-                          <a:effectLst/>
-                        </a:rPr>
-                        <a:t>2</a:t>
-                      </a:r>
-                      <a:endParaRPr lang="en-US" sz="600" b="0" i="0" u="none" strike="noStrike">
-                        <a:solidFill>
-                          <a:srgbClr val="000000"/>
-                        </a:solidFill>
-                        <a:effectLst/>
-                        <a:latin typeface="Calibri"/>
-                      </a:endParaRPr>
-                    </a:p>
-                  </a:txBody>
-                  <a:tcPr marL="5627" marR="5627" marT="5627" marB="0" anchor="b"/>
-                </a:tc>
-                <a:tc>
-                  <a:txBody>
-                    <a:bodyPr/>
-                    <a:lstStyle/>
-                    <a:p>
-                      <a:pPr algn="l" fontAlgn="b"/>
-                      <a:endParaRPr lang="en-US" sz="600" b="0" i="0" u="none" strike="noStrike">
-                        <a:solidFill>
-                          <a:srgbClr val="000000"/>
-                        </a:solidFill>
-                        <a:effectLst/>
-                        <a:latin typeface="Calibri"/>
-                      </a:endParaRPr>
-                    </a:p>
-                  </a:txBody>
-                  <a:tcPr marL="5627" marR="5627" marT="5627" marB="0" anchor="b"/>
-                </a:tc>
-                <a:tc gridSpan="3">
-                  <a:txBody>
-                    <a:bodyPr/>
-                    <a:lstStyle/>
-                    <a:p>
-                      <a:pPr algn="ctr" fontAlgn="b"/>
-                      <a:r>
-                        <a:rPr lang="en-US" sz="600" u="none" strike="noStrike">
-                          <a:effectLst/>
-                        </a:rPr>
-                        <a:t>Iteration 3</a:t>
-                      </a:r>
-                      <a:endParaRPr lang="en-US" sz="600" b="0" i="0" u="none" strike="noStrike">
-                        <a:solidFill>
-                          <a:srgbClr val="000000"/>
-                        </a:solidFill>
-                        <a:effectLst/>
-                        <a:latin typeface="Calibri"/>
-                      </a:endParaRPr>
-                    </a:p>
-                  </a:txBody>
-                  <a:tcPr marL="5627" marR="5627" marT="5627" marB="0" anchor="b"/>
-                </a:tc>
-                <a:tc hMerge="1">
-                  <a:txBody>
-                    <a:bodyPr/>
-                    <a:lstStyle/>
-                    <a:p>
-                      <a:endParaRPr lang="en-US"/>
-                    </a:p>
-                  </a:txBody>
-                  <a:tcPr/>
-                </a:tc>
-                <a:tc hMerge="1">
-                  <a:txBody>
-                    <a:bodyPr/>
-                    <a:lstStyle/>
-                    <a:p>
-                      <a:endParaRPr lang="en-US"/>
-                    </a:p>
-                  </a:txBody>
-                  <a:tcPr/>
-                </a:tc>
-              </a:tr>
-              <a:tr h="216614">
-                <a:tc>
-                  <a:txBody>
-                    <a:bodyPr/>
-                    <a:lstStyle/>
-                    <a:p>
-                      <a:pPr algn="l" fontAlgn="b"/>
-                      <a:r>
-                        <a:rPr lang="en-US" sz="600" u="none" strike="noStrike">
-                          <a:effectLst/>
-                        </a:rPr>
-                        <a:t> </a:t>
-                      </a:r>
-                      <a:endParaRPr lang="en-US" sz="600" b="0" i="0" u="none" strike="noStrike">
-                        <a:solidFill>
-                          <a:srgbClr val="000000"/>
-                        </a:solidFill>
-                        <a:effectLst/>
-                        <a:latin typeface="Calibri"/>
-                      </a:endParaRPr>
-                    </a:p>
-                  </a:txBody>
-                  <a:tcPr marL="5627" marR="5627" marT="5627" marB="0" anchor="b"/>
-                </a:tc>
-                <a:tc>
-                  <a:txBody>
-                    <a:bodyPr/>
-                    <a:lstStyle/>
-                    <a:p>
-                      <a:pPr algn="l" fontAlgn="b"/>
-                      <a:r>
-                        <a:rPr lang="en-US" sz="600" u="none" strike="noStrike">
-                          <a:effectLst/>
-                        </a:rPr>
-                        <a:t> </a:t>
-                      </a:r>
-                      <a:endParaRPr lang="en-US" sz="600" b="0" i="0" u="none" strike="noStrike">
-                        <a:solidFill>
-                          <a:srgbClr val="000000"/>
-                        </a:solidFill>
-                        <a:effectLst/>
-                        <a:latin typeface="Calibri"/>
-                      </a:endParaRPr>
-                    </a:p>
-                  </a:txBody>
-                  <a:tcPr marL="5627" marR="5627" marT="5627" marB="0" anchor="b"/>
-                </a:tc>
-                <a:tc>
-                  <a:txBody>
-                    <a:bodyPr/>
-                    <a:lstStyle/>
-                    <a:p>
-                      <a:pPr algn="l" fontAlgn="b"/>
-                      <a:r>
-                        <a:rPr lang="en-US" sz="600" u="none" strike="noStrike">
-                          <a:effectLst/>
-                        </a:rPr>
-                        <a:t> </a:t>
-                      </a:r>
-                      <a:endParaRPr lang="en-US" sz="600" b="0" i="0" u="none" strike="noStrike">
-                        <a:solidFill>
-                          <a:srgbClr val="000000"/>
-                        </a:solidFill>
-                        <a:effectLst/>
-                        <a:latin typeface="Calibri"/>
-                      </a:endParaRPr>
-                    </a:p>
-                  </a:txBody>
-                  <a:tcPr marL="5627" marR="5627" marT="5627" marB="0" anchor="b"/>
-                </a:tc>
-                <a:tc>
-                  <a:txBody>
-                    <a:bodyPr/>
-                    <a:lstStyle/>
-                    <a:p>
-                      <a:pPr algn="l" fontAlgn="b"/>
-                      <a:r>
-                        <a:rPr lang="en-US" sz="600" u="none" strike="noStrike">
-                          <a:effectLst/>
-                        </a:rPr>
-                        <a:t>Implement SQL</a:t>
-                      </a:r>
-                      <a:endParaRPr lang="en-US" sz="600" b="0" i="0" u="none" strike="noStrike">
-                        <a:solidFill>
-                          <a:srgbClr val="000000"/>
-                        </a:solidFill>
-                        <a:effectLst/>
-                        <a:latin typeface="Calibri"/>
-                      </a:endParaRPr>
-                    </a:p>
-                  </a:txBody>
-                  <a:tcPr marL="5627" marR="5627" marT="5627" marB="0" anchor="b"/>
-                </a:tc>
-                <a:tc>
-                  <a:txBody>
-                    <a:bodyPr/>
-                    <a:lstStyle/>
-                    <a:p>
-                      <a:pPr algn="l" fontAlgn="b"/>
-                      <a:r>
-                        <a:rPr lang="en-US" sz="600" u="none" strike="noStrike">
-                          <a:effectLst/>
-                        </a:rPr>
-                        <a:t> </a:t>
-                      </a:r>
-                      <a:endParaRPr lang="en-US" sz="600" b="0" i="0" u="none" strike="noStrike">
-                        <a:solidFill>
-                          <a:srgbClr val="000000"/>
-                        </a:solidFill>
-                        <a:effectLst/>
-                        <a:latin typeface="Calibri"/>
-                      </a:endParaRPr>
-                    </a:p>
-                  </a:txBody>
-                  <a:tcPr marL="5627" marR="5627" marT="5627" marB="0" anchor="b"/>
-                </a:tc>
-                <a:tc>
-                  <a:txBody>
-                    <a:bodyPr/>
-                    <a:lstStyle/>
-                    <a:p>
-                      <a:pPr algn="r" fontAlgn="b"/>
-                      <a:r>
-                        <a:rPr lang="en-US" sz="600" u="none" strike="noStrike">
-                          <a:effectLst/>
-                        </a:rPr>
-                        <a:t>15</a:t>
-                      </a:r>
-                      <a:endParaRPr lang="en-US" sz="600" b="0" i="0" u="none" strike="noStrike">
-                        <a:solidFill>
-                          <a:srgbClr val="000000"/>
-                        </a:solidFill>
-                        <a:effectLst/>
-                        <a:latin typeface="Calibri"/>
-                      </a:endParaRPr>
-                    </a:p>
-                  </a:txBody>
-                  <a:tcPr marL="5627" marR="5627" marT="5627" marB="0" anchor="b"/>
-                </a:tc>
-                <a:tc>
-                  <a:txBody>
-                    <a:bodyPr/>
-                    <a:lstStyle/>
-                    <a:p>
-                      <a:pPr algn="l" fontAlgn="b"/>
-                      <a:r>
-                        <a:rPr lang="en-US" sz="600" u="none" strike="noStrike">
-                          <a:effectLst/>
-                        </a:rPr>
-                        <a:t> </a:t>
-                      </a:r>
-                      <a:endParaRPr lang="en-US" sz="600" b="0" i="0" u="none" strike="noStrike">
-                        <a:solidFill>
-                          <a:srgbClr val="000000"/>
-                        </a:solidFill>
-                        <a:effectLst/>
-                        <a:latin typeface="Calibri"/>
-                      </a:endParaRPr>
-                    </a:p>
-                  </a:txBody>
-                  <a:tcPr marL="5627" marR="5627" marT="5627" marB="0" anchor="b"/>
-                </a:tc>
-                <a:tc>
-                  <a:txBody>
-                    <a:bodyPr/>
-                    <a:lstStyle/>
-                    <a:p>
-                      <a:pPr algn="r" fontAlgn="b"/>
-                      <a:r>
-                        <a:rPr lang="en-US" sz="600" u="none" strike="noStrike">
-                          <a:effectLst/>
-                        </a:rPr>
-                        <a:t>15</a:t>
-                      </a:r>
-                      <a:endParaRPr lang="en-US" sz="600" b="0" i="0" u="none" strike="noStrike">
-                        <a:solidFill>
-                          <a:srgbClr val="000000"/>
-                        </a:solidFill>
-                        <a:effectLst/>
-                        <a:latin typeface="Calibri"/>
-                      </a:endParaRPr>
-                    </a:p>
-                  </a:txBody>
-                  <a:tcPr marL="5627" marR="5627" marT="5627" marB="0" anchor="b"/>
-                </a:tc>
-                <a:tc>
-                  <a:txBody>
-                    <a:bodyPr/>
-                    <a:lstStyle/>
-                    <a:p>
-                      <a:pPr algn="l" fontAlgn="b"/>
-                      <a:endParaRPr lang="en-US" sz="600" b="0" i="0" u="none" strike="noStrike">
-                        <a:solidFill>
-                          <a:srgbClr val="000000"/>
-                        </a:solidFill>
-                        <a:effectLst/>
-                        <a:latin typeface="Calibri"/>
-                      </a:endParaRPr>
-                    </a:p>
-                  </a:txBody>
-                  <a:tcPr marL="5627" marR="5627" marT="5627" marB="0" anchor="b"/>
-                </a:tc>
-                <a:tc>
-                  <a:txBody>
-                    <a:bodyPr/>
-                    <a:lstStyle/>
-                    <a:p>
-                      <a:pPr algn="l" fontAlgn="b"/>
-                      <a:r>
-                        <a:rPr lang="en-US" sz="600" u="none" strike="noStrike">
-                          <a:effectLst/>
-                        </a:rPr>
-                        <a:t>Planned</a:t>
-                      </a:r>
-                      <a:endParaRPr lang="en-US" sz="600" b="0" i="0" u="none" strike="noStrike">
-                        <a:solidFill>
-                          <a:srgbClr val="000000"/>
-                        </a:solidFill>
-                        <a:effectLst/>
-                        <a:latin typeface="Calibri"/>
-                      </a:endParaRPr>
-                    </a:p>
-                  </a:txBody>
-                  <a:tcPr marL="5627" marR="5627" marT="5627" marB="0" anchor="b"/>
-                </a:tc>
-                <a:tc>
-                  <a:txBody>
-                    <a:bodyPr/>
-                    <a:lstStyle/>
-                    <a:p>
-                      <a:pPr algn="l" fontAlgn="b"/>
-                      <a:r>
-                        <a:rPr lang="en-US" sz="600" u="none" strike="noStrike">
-                          <a:effectLst/>
-                        </a:rPr>
-                        <a:t>Actual</a:t>
-                      </a:r>
-                      <a:endParaRPr lang="en-US" sz="600" b="0" i="0" u="none" strike="noStrike">
-                        <a:solidFill>
-                          <a:srgbClr val="000000"/>
-                        </a:solidFill>
-                        <a:effectLst/>
-                        <a:latin typeface="Calibri"/>
-                      </a:endParaRPr>
-                    </a:p>
-                  </a:txBody>
-                  <a:tcPr marL="5627" marR="5627" marT="5627" marB="0" anchor="b"/>
-                </a:tc>
-                <a:tc>
-                  <a:txBody>
-                    <a:bodyPr/>
-                    <a:lstStyle/>
-                    <a:p>
-                      <a:pPr algn="l" fontAlgn="b"/>
-                      <a:r>
-                        <a:rPr lang="en-US" sz="600" u="none" strike="noStrike">
-                          <a:effectLst/>
-                        </a:rPr>
-                        <a:t>Remaining</a:t>
-                      </a:r>
-                      <a:endParaRPr lang="en-US" sz="600" b="0" i="0" u="none" strike="noStrike">
-                        <a:solidFill>
-                          <a:srgbClr val="000000"/>
-                        </a:solidFill>
-                        <a:effectLst/>
-                        <a:latin typeface="Calibri"/>
-                      </a:endParaRPr>
-                    </a:p>
-                  </a:txBody>
-                  <a:tcPr marL="5627" marR="5627" marT="5627" marB="0" anchor="b"/>
-                </a:tc>
-              </a:tr>
-              <a:tr h="119677">
-                <a:tc>
-                  <a:txBody>
-                    <a:bodyPr/>
-                    <a:lstStyle/>
-                    <a:p>
-                      <a:pPr algn="l" fontAlgn="b"/>
-                      <a:r>
-                        <a:rPr lang="en-US" sz="600" u="none" strike="noStrike">
-                          <a:effectLst/>
-                        </a:rPr>
-                        <a:t> </a:t>
-                      </a:r>
-                      <a:endParaRPr lang="en-US" sz="600" b="0" i="0" u="none" strike="noStrike">
-                        <a:solidFill>
-                          <a:srgbClr val="000000"/>
-                        </a:solidFill>
-                        <a:effectLst/>
-                        <a:latin typeface="Calibri"/>
-                      </a:endParaRPr>
-                    </a:p>
-                  </a:txBody>
-                  <a:tcPr marL="5627" marR="5627" marT="5627" marB="0" anchor="b"/>
-                </a:tc>
-                <a:tc>
-                  <a:txBody>
-                    <a:bodyPr/>
-                    <a:lstStyle/>
-                    <a:p>
-                      <a:pPr algn="l" fontAlgn="b"/>
-                      <a:r>
-                        <a:rPr lang="en-US" sz="600" u="none" strike="noStrike">
-                          <a:effectLst/>
-                        </a:rPr>
-                        <a:t> </a:t>
-                      </a:r>
-                      <a:endParaRPr lang="en-US" sz="600" b="0" i="0" u="none" strike="noStrike">
-                        <a:solidFill>
-                          <a:srgbClr val="000000"/>
-                        </a:solidFill>
-                        <a:effectLst/>
-                        <a:latin typeface="Calibri"/>
-                      </a:endParaRPr>
-                    </a:p>
-                  </a:txBody>
-                  <a:tcPr marL="5627" marR="5627" marT="5627" marB="0" anchor="b"/>
-                </a:tc>
-                <a:tc>
-                  <a:txBody>
-                    <a:bodyPr/>
-                    <a:lstStyle/>
-                    <a:p>
-                      <a:pPr algn="l" fontAlgn="b"/>
-                      <a:r>
-                        <a:rPr lang="en-US" sz="600" u="none" strike="noStrike">
-                          <a:effectLst/>
-                        </a:rPr>
-                        <a:t> </a:t>
-                      </a:r>
-                      <a:endParaRPr lang="en-US" sz="600" b="0" i="0" u="none" strike="noStrike">
-                        <a:solidFill>
-                          <a:srgbClr val="000000"/>
-                        </a:solidFill>
-                        <a:effectLst/>
-                        <a:latin typeface="Calibri"/>
-                      </a:endParaRPr>
-                    </a:p>
-                  </a:txBody>
-                  <a:tcPr marL="5627" marR="5627" marT="5627" marB="0" anchor="b"/>
-                </a:tc>
-                <a:tc>
-                  <a:txBody>
-                    <a:bodyPr/>
-                    <a:lstStyle/>
-                    <a:p>
-                      <a:pPr algn="l" fontAlgn="b"/>
-                      <a:r>
-                        <a:rPr lang="en-US" sz="600" u="none" strike="noStrike">
-                          <a:effectLst/>
-                        </a:rPr>
-                        <a:t>Build Visualization</a:t>
-                      </a:r>
-                      <a:endParaRPr lang="en-US" sz="600" b="0" i="0" u="none" strike="noStrike">
-                        <a:solidFill>
-                          <a:srgbClr val="000000"/>
-                        </a:solidFill>
-                        <a:effectLst/>
-                        <a:latin typeface="Calibri"/>
-                      </a:endParaRPr>
-                    </a:p>
-                  </a:txBody>
-                  <a:tcPr marL="5627" marR="5627" marT="5627" marB="0" anchor="b"/>
-                </a:tc>
-                <a:tc>
-                  <a:txBody>
-                    <a:bodyPr/>
-                    <a:lstStyle/>
-                    <a:p>
-                      <a:pPr algn="l" fontAlgn="b"/>
-                      <a:r>
-                        <a:rPr lang="en-US" sz="600" u="none" strike="noStrike">
-                          <a:effectLst/>
-                        </a:rPr>
-                        <a:t> </a:t>
-                      </a:r>
-                      <a:endParaRPr lang="en-US" sz="600" b="0" i="0" u="none" strike="noStrike">
-                        <a:solidFill>
-                          <a:srgbClr val="000000"/>
-                        </a:solidFill>
-                        <a:effectLst/>
-                        <a:latin typeface="Calibri"/>
-                      </a:endParaRPr>
-                    </a:p>
-                  </a:txBody>
-                  <a:tcPr marL="5627" marR="5627" marT="5627" marB="0" anchor="b"/>
-                </a:tc>
-                <a:tc>
-                  <a:txBody>
-                    <a:bodyPr/>
-                    <a:lstStyle/>
-                    <a:p>
-                      <a:pPr algn="r" fontAlgn="b"/>
-                      <a:r>
-                        <a:rPr lang="en-US" sz="600" u="none" strike="noStrike">
-                          <a:effectLst/>
-                        </a:rPr>
-                        <a:t>15</a:t>
-                      </a:r>
-                      <a:endParaRPr lang="en-US" sz="600" b="0" i="0" u="none" strike="noStrike">
-                        <a:solidFill>
-                          <a:srgbClr val="000000"/>
-                        </a:solidFill>
-                        <a:effectLst/>
-                        <a:latin typeface="Calibri"/>
-                      </a:endParaRPr>
-                    </a:p>
-                  </a:txBody>
-                  <a:tcPr marL="5627" marR="5627" marT="5627" marB="0" anchor="b"/>
-                </a:tc>
-                <a:tc>
-                  <a:txBody>
-                    <a:bodyPr/>
-                    <a:lstStyle/>
-                    <a:p>
-                      <a:pPr algn="l" fontAlgn="b"/>
-                      <a:r>
-                        <a:rPr lang="en-US" sz="600" u="none" strike="noStrike">
-                          <a:effectLst/>
-                        </a:rPr>
-                        <a:t> </a:t>
-                      </a:r>
-                      <a:endParaRPr lang="en-US" sz="600" b="0" i="0" u="none" strike="noStrike">
-                        <a:solidFill>
-                          <a:srgbClr val="000000"/>
-                        </a:solidFill>
-                        <a:effectLst/>
-                        <a:latin typeface="Calibri"/>
-                      </a:endParaRPr>
-                    </a:p>
-                  </a:txBody>
-                  <a:tcPr marL="5627" marR="5627" marT="5627" marB="0" anchor="b"/>
-                </a:tc>
-                <a:tc>
-                  <a:txBody>
-                    <a:bodyPr/>
-                    <a:lstStyle/>
-                    <a:p>
-                      <a:pPr algn="r" fontAlgn="b"/>
-                      <a:r>
-                        <a:rPr lang="en-US" sz="600" u="none" strike="noStrike">
-                          <a:effectLst/>
-                        </a:rPr>
-                        <a:t>15</a:t>
-                      </a:r>
-                      <a:endParaRPr lang="en-US" sz="600" b="0" i="0" u="none" strike="noStrike">
-                        <a:solidFill>
-                          <a:srgbClr val="000000"/>
-                        </a:solidFill>
-                        <a:effectLst/>
-                        <a:latin typeface="Calibri"/>
-                      </a:endParaRPr>
-                    </a:p>
-                  </a:txBody>
-                  <a:tcPr marL="5627" marR="5627" marT="5627" marB="0" anchor="b"/>
-                </a:tc>
-                <a:tc>
-                  <a:txBody>
-                    <a:bodyPr/>
-                    <a:lstStyle/>
-                    <a:p>
-                      <a:pPr algn="l" fontAlgn="b"/>
-                      <a:endParaRPr lang="en-US" sz="600" b="0" i="0" u="none" strike="noStrike">
-                        <a:solidFill>
-                          <a:srgbClr val="000000"/>
-                        </a:solidFill>
-                        <a:effectLst/>
-                        <a:latin typeface="Calibri"/>
-                      </a:endParaRPr>
-                    </a:p>
-                  </a:txBody>
-                  <a:tcPr marL="5627" marR="5627" marT="5627" marB="0" anchor="b"/>
-                </a:tc>
-                <a:tc>
-                  <a:txBody>
-                    <a:bodyPr/>
-                    <a:lstStyle/>
-                    <a:p>
-                      <a:pPr algn="r" fontAlgn="b"/>
-                      <a:r>
-                        <a:rPr lang="en-US" sz="600" u="none" strike="noStrike">
-                          <a:effectLst/>
-                        </a:rPr>
-                        <a:t>44</a:t>
+              <a:tr h="121463">
+                <a:tc>
+                  <a:txBody>
+                    <a:bodyPr/>
+                    <a:lstStyle/>
+                    <a:p>
+                      <a:pPr algn="l" fontAlgn="b"/>
+                      <a:endParaRPr lang="en-US" sz="600" b="0" i="0" u="none" strike="noStrike">
+                        <a:solidFill>
+                          <a:srgbClr val="000000"/>
+                        </a:solidFill>
+                        <a:effectLst/>
+                        <a:latin typeface="Calibri"/>
+                      </a:endParaRPr>
+                    </a:p>
+                  </a:txBody>
+                  <a:tcPr marL="5627" marR="5627" marT="5627" marB="0" anchor="b"/>
+                </a:tc>
+                <a:tc>
+                  <a:txBody>
+                    <a:bodyPr/>
+                    <a:lstStyle/>
+                    <a:p>
+                      <a:pPr algn="l" fontAlgn="b"/>
+                      <a:endParaRPr lang="en-US" sz="600" b="0" i="0" u="none" strike="noStrike">
+                        <a:solidFill>
+                          <a:srgbClr val="000000"/>
+                        </a:solidFill>
+                        <a:effectLst/>
+                        <a:latin typeface="Calibri"/>
+                      </a:endParaRPr>
+                    </a:p>
+                  </a:txBody>
+                  <a:tcPr marL="5627" marR="5627" marT="5627" marB="0" anchor="b"/>
+                </a:tc>
+                <a:tc>
+                  <a:txBody>
+                    <a:bodyPr/>
+                    <a:lstStyle/>
+                    <a:p>
+                      <a:pPr algn="l" fontAlgn="b"/>
+                      <a:r>
+                        <a:rPr lang="en-US" sz="600" u="none" strike="noStrike">
+                          <a:effectLst/>
+                        </a:rPr>
+                        <a:t>Total Work</a:t>
+                      </a:r>
+                      <a:endParaRPr lang="en-US" sz="600" b="0" i="0" u="none" strike="noStrike">
+                        <a:solidFill>
+                          <a:srgbClr val="000000"/>
+                        </a:solidFill>
+                        <a:effectLst/>
+                        <a:latin typeface="Calibri"/>
+                      </a:endParaRPr>
+                    </a:p>
+                  </a:txBody>
+                  <a:tcPr marL="5627" marR="5627" marT="5627" marB="0" anchor="b"/>
+                </a:tc>
+                <a:tc>
+                  <a:txBody>
+                    <a:bodyPr/>
+                    <a:lstStyle/>
+                    <a:p>
+                      <a:pPr algn="l" fontAlgn="b"/>
+                      <a:endParaRPr lang="en-US" sz="600" b="0" i="0" u="none" strike="noStrike">
+                        <a:solidFill>
+                          <a:srgbClr val="000000"/>
+                        </a:solidFill>
+                        <a:effectLst/>
+                        <a:latin typeface="Calibri"/>
+                      </a:endParaRPr>
+                    </a:p>
+                  </a:txBody>
+                  <a:tcPr marL="5627" marR="5627" marT="5627" marB="0" anchor="b"/>
+                </a:tc>
+                <a:tc>
+                  <a:txBody>
+                    <a:bodyPr/>
+                    <a:lstStyle/>
+                    <a:p>
+                      <a:pPr algn="l" fontAlgn="b"/>
+                      <a:endParaRPr lang="en-US" sz="600" b="0" i="0" u="none" strike="noStrike">
+                        <a:solidFill>
+                          <a:srgbClr val="000000"/>
+                        </a:solidFill>
+                        <a:effectLst/>
+                        <a:latin typeface="Calibri"/>
+                      </a:endParaRPr>
+                    </a:p>
+                  </a:txBody>
+                  <a:tcPr marL="5627" marR="5627" marT="5627" marB="0" anchor="b"/>
+                </a:tc>
+                <a:tc>
+                  <a:txBody>
+                    <a:bodyPr/>
+                    <a:lstStyle/>
+                    <a:p>
+                      <a:pPr algn="r" fontAlgn="b"/>
+                      <a:r>
+                        <a:rPr lang="en-US" sz="600" u="none" strike="noStrike">
+                          <a:effectLst/>
+                        </a:rPr>
+                        <a:t>104</a:t>
+                      </a:r>
+                      <a:endParaRPr lang="en-US" sz="600" b="0" i="0" u="none" strike="noStrike">
+                        <a:solidFill>
+                          <a:srgbClr val="000000"/>
+                        </a:solidFill>
+                        <a:effectLst/>
+                        <a:latin typeface="Calibri"/>
+                      </a:endParaRPr>
+                    </a:p>
+                  </a:txBody>
+                  <a:tcPr marL="5627" marR="5627" marT="5627" marB="0" anchor="b"/>
+                </a:tc>
+                <a:tc>
+                  <a:txBody>
+                    <a:bodyPr/>
+                    <a:lstStyle/>
+                    <a:p>
+                      <a:pPr algn="r" fontAlgn="b"/>
+                      <a:r>
+                        <a:rPr lang="en-US" sz="600" u="none" strike="noStrike">
+                          <a:effectLst/>
+                        </a:rPr>
+                        <a:t>101</a:t>
                       </a:r>
                       <a:endParaRPr lang="en-US" sz="600" b="0" i="0" u="none" strike="noStrike">
                         <a:solidFill>
@@ -14597,186 +14866,13 @@
                     <a:bodyPr/>
                     <a:lstStyle/>
                     <a:p>
-                      <a:pPr algn="r" fontAlgn="b"/>
-                      <a:r>
-                        <a:rPr lang="en-US" sz="600" u="none" strike="noStrike">
-                          <a:effectLst/>
-                        </a:rPr>
-                        <a:t>43</a:t>
-                      </a:r>
-                      <a:endParaRPr lang="en-US" sz="600" b="0" i="0" u="none" strike="noStrike">
-                        <a:solidFill>
-                          <a:srgbClr val="000000"/>
-                        </a:solidFill>
-                        <a:effectLst/>
-                        <a:latin typeface="Calibri"/>
-                      </a:endParaRPr>
-                    </a:p>
-                  </a:txBody>
-                  <a:tcPr marL="5627" marR="5627" marT="5627" marB="0" anchor="b"/>
-                </a:tc>
-              </a:tr>
-              <a:tr h="119677">
-                <a:tc>
-                  <a:txBody>
-                    <a:bodyPr/>
-                    <a:lstStyle/>
-                    <a:p>
-                      <a:pPr algn="l" fontAlgn="b"/>
-                      <a:endParaRPr lang="en-US" sz="600" b="0" i="0" u="none" strike="noStrike">
-                        <a:solidFill>
-                          <a:srgbClr val="000000"/>
-                        </a:solidFill>
-                        <a:effectLst/>
-                        <a:latin typeface="Calibri"/>
-                      </a:endParaRPr>
-                    </a:p>
-                  </a:txBody>
-                  <a:tcPr marL="5627" marR="5627" marT="5627" marB="0" anchor="b"/>
-                </a:tc>
-                <a:tc>
-                  <a:txBody>
-                    <a:bodyPr/>
-                    <a:lstStyle/>
-                    <a:p>
-                      <a:pPr algn="l" fontAlgn="b"/>
-                      <a:endParaRPr lang="en-US" sz="600" b="0" i="0" u="none" strike="noStrike">
-                        <a:solidFill>
-                          <a:srgbClr val="000000"/>
-                        </a:solidFill>
-                        <a:effectLst/>
-                        <a:latin typeface="Calibri"/>
-                      </a:endParaRPr>
-                    </a:p>
-                  </a:txBody>
-                  <a:tcPr marL="5627" marR="5627" marT="5627" marB="0" anchor="b"/>
-                </a:tc>
-                <a:tc>
-                  <a:txBody>
-                    <a:bodyPr/>
-                    <a:lstStyle/>
-                    <a:p>
-                      <a:pPr algn="l" fontAlgn="b"/>
-                      <a:r>
-                        <a:rPr lang="en-US" sz="600" u="none" strike="noStrike">
-                          <a:effectLst/>
-                        </a:rPr>
-                        <a:t>Total Work</a:t>
-                      </a:r>
-                      <a:endParaRPr lang="en-US" sz="600" b="0" i="0" u="none" strike="noStrike">
-                        <a:solidFill>
-                          <a:srgbClr val="000000"/>
-                        </a:solidFill>
-                        <a:effectLst/>
-                        <a:latin typeface="Calibri"/>
-                      </a:endParaRPr>
-                    </a:p>
-                  </a:txBody>
-                  <a:tcPr marL="5627" marR="5627" marT="5627" marB="0" anchor="b"/>
-                </a:tc>
-                <a:tc>
-                  <a:txBody>
-                    <a:bodyPr/>
-                    <a:lstStyle/>
-                    <a:p>
-                      <a:pPr algn="l" fontAlgn="b"/>
-                      <a:endParaRPr lang="en-US" sz="600" b="0" i="0" u="none" strike="noStrike">
-                        <a:solidFill>
-                          <a:srgbClr val="000000"/>
-                        </a:solidFill>
-                        <a:effectLst/>
-                        <a:latin typeface="Calibri"/>
-                      </a:endParaRPr>
-                    </a:p>
-                  </a:txBody>
-                  <a:tcPr marL="5627" marR="5627" marT="5627" marB="0" anchor="b"/>
-                </a:tc>
-                <a:tc>
-                  <a:txBody>
-                    <a:bodyPr/>
-                    <a:lstStyle/>
-                    <a:p>
-                      <a:pPr algn="l" fontAlgn="b"/>
-                      <a:endParaRPr lang="en-US" sz="600" b="0" i="0" u="none" strike="noStrike">
-                        <a:solidFill>
-                          <a:srgbClr val="000000"/>
-                        </a:solidFill>
-                        <a:effectLst/>
-                        <a:latin typeface="Calibri"/>
-                      </a:endParaRPr>
-                    </a:p>
-                  </a:txBody>
-                  <a:tcPr marL="5627" marR="5627" marT="5627" marB="0" anchor="b"/>
-                </a:tc>
-                <a:tc>
-                  <a:txBody>
-                    <a:bodyPr/>
-                    <a:lstStyle/>
-                    <a:p>
-                      <a:pPr algn="r" fontAlgn="b"/>
-                      <a:r>
-                        <a:rPr lang="en-US" sz="600" u="none" strike="noStrike">
-                          <a:effectLst/>
-                        </a:rPr>
-                        <a:t>104</a:t>
-                      </a:r>
-                      <a:endParaRPr lang="en-US" sz="600" b="0" i="0" u="none" strike="noStrike">
-                        <a:solidFill>
-                          <a:srgbClr val="000000"/>
-                        </a:solidFill>
-                        <a:effectLst/>
-                        <a:latin typeface="Calibri"/>
-                      </a:endParaRPr>
-                    </a:p>
-                  </a:txBody>
-                  <a:tcPr marL="5627" marR="5627" marT="5627" marB="0" anchor="b"/>
-                </a:tc>
-                <a:tc>
-                  <a:txBody>
-                    <a:bodyPr/>
-                    <a:lstStyle/>
-                    <a:p>
-                      <a:pPr algn="l" fontAlgn="b"/>
-                      <a:endParaRPr lang="en-US" sz="600" b="0" i="0" u="none" strike="noStrike">
-                        <a:solidFill>
-                          <a:srgbClr val="000000"/>
-                        </a:solidFill>
-                        <a:effectLst/>
-                        <a:latin typeface="Calibri"/>
-                      </a:endParaRPr>
-                    </a:p>
-                  </a:txBody>
-                  <a:tcPr marL="5627" marR="5627" marT="5627" marB="0" anchor="b"/>
-                </a:tc>
-                <a:tc>
-                  <a:txBody>
-                    <a:bodyPr/>
-                    <a:lstStyle/>
-                    <a:p>
-                      <a:pPr algn="r" fontAlgn="b"/>
-                      <a:r>
-                        <a:rPr lang="en-US" sz="600" u="none" strike="noStrike">
-                          <a:effectLst/>
-                        </a:rPr>
-                        <a:t>48</a:t>
-                      </a:r>
-                      <a:endParaRPr lang="en-US" sz="600" b="0" i="0" u="none" strike="noStrike">
-                        <a:solidFill>
-                          <a:srgbClr val="000000"/>
-                        </a:solidFill>
-                        <a:effectLst/>
-                        <a:latin typeface="Calibri"/>
-                      </a:endParaRPr>
-                    </a:p>
-                  </a:txBody>
-                  <a:tcPr marL="5627" marR="5627" marT="5627" marB="0" anchor="b"/>
-                </a:tc>
-                <a:tc>
-                  <a:txBody>
-                    <a:bodyPr/>
-                    <a:lstStyle/>
-                    <a:p>
-                      <a:pPr algn="l" fontAlgn="b"/>
+                      <a:pPr algn="l" fontAlgn="b"/>
+                      <a:r>
+                        <a:rPr lang="en-US" sz="600" u="none" strike="noStrike">
+                          <a:effectLst/>
+                        </a:rPr>
+                        <a:t>Done</a:t>
+                      </a:r>
                       <a:endParaRPr lang="en-US" sz="600" b="0" i="0" u="none" strike="noStrike">
                         <a:solidFill>
                           <a:srgbClr val="000000"/>

</xml_diff>